<commit_message>
Updated outline file and added slides for version control systems
</commit_message>
<xml_diff>
--- a/Agile Development.pptx
+++ b/Agile Development.pptx
@@ -4,10 +4,19 @@
   <p:sldMasterIdLst>
     <p:sldMasterId id="2147483648" r:id="rId1"/>
   </p:sldMasterIdLst>
+  <p:notesMasterIdLst>
+    <p:notesMasterId r:id="rId11"/>
+  </p:notesMasterIdLst>
   <p:sldIdLst>
     <p:sldId id="256" r:id="rId2"/>
     <p:sldId id="257" r:id="rId3"/>
     <p:sldId id="258" r:id="rId4"/>
+    <p:sldId id="259" r:id="rId5"/>
+    <p:sldId id="260" r:id="rId6"/>
+    <p:sldId id="261" r:id="rId7"/>
+    <p:sldId id="262" r:id="rId8"/>
+    <p:sldId id="263" r:id="rId9"/>
+    <p:sldId id="264" r:id="rId10"/>
   </p:sldIdLst>
   <p:sldSz cx="12192000" cy="6858000"/>
   <p:notesSz cx="6858000" cy="9144000"/>
@@ -106,7 +115,826 @@
       </a:defRPr>
     </a:lvl9pPr>
   </p:defaultTextStyle>
+  <p:extLst>
+    <p:ext uri="{EFAFB233-063F-42B5-8137-9DF3F51BA10A}">
+      <p15:sldGuideLst xmlns:p15="http://schemas.microsoft.com/office/powerpoint/2012/main"/>
+    </p:ext>
+  </p:extLst>
 </p:presentation>
+</file>
+
+<file path=ppt/notesMasters/notesMaster1.xml><?xml version="1.0" encoding="utf-8"?>
+<p:notesMaster xmlns:a="http://schemas.openxmlformats.org/drawingml/2006/main" xmlns:r="http://schemas.openxmlformats.org/officeDocument/2006/relationships" xmlns:p="http://schemas.openxmlformats.org/presentationml/2006/main">
+  <p:cSld>
+    <p:bg>
+      <p:bgRef idx="1001">
+        <a:schemeClr val="bg1"/>
+      </p:bgRef>
+    </p:bg>
+    <p:spTree>
+      <p:nvGrpSpPr>
+        <p:cNvPr id="1" name=""/>
+        <p:cNvGrpSpPr/>
+        <p:nvPr/>
+      </p:nvGrpSpPr>
+      <p:grpSpPr>
+        <a:xfrm>
+          <a:off x="0" y="0"/>
+          <a:ext cx="0" cy="0"/>
+          <a:chOff x="0" y="0"/>
+          <a:chExt cx="0" cy="0"/>
+        </a:xfrm>
+      </p:grpSpPr>
+      <p:sp>
+        <p:nvSpPr>
+          <p:cNvPr id="2" name="Header Placeholder 1"/>
+          <p:cNvSpPr>
+            <a:spLocks noGrp="1"/>
+          </p:cNvSpPr>
+          <p:nvPr>
+            <p:ph type="hdr" sz="quarter"/>
+          </p:nvPr>
+        </p:nvSpPr>
+        <p:spPr>
+          <a:xfrm>
+            <a:off x="0" y="0"/>
+            <a:ext cx="2971800" cy="458788"/>
+          </a:xfrm>
+          <a:prstGeom prst="rect">
+            <a:avLst/>
+          </a:prstGeom>
+        </p:spPr>
+        <p:txBody>
+          <a:bodyPr vert="horz" lIns="91440" tIns="45720" rIns="91440" bIns="45720" rtlCol="0"/>
+          <a:lstStyle>
+            <a:lvl1pPr algn="l">
+              <a:defRPr sz="1200"/>
+            </a:lvl1pPr>
+          </a:lstStyle>
+          <a:p>
+            <a:endParaRPr lang="fil-PH"/>
+          </a:p>
+        </p:txBody>
+      </p:sp>
+      <p:sp>
+        <p:nvSpPr>
+          <p:cNvPr id="3" name="Date Placeholder 2"/>
+          <p:cNvSpPr>
+            <a:spLocks noGrp="1"/>
+          </p:cNvSpPr>
+          <p:nvPr>
+            <p:ph type="dt" idx="1"/>
+          </p:nvPr>
+        </p:nvSpPr>
+        <p:spPr>
+          <a:xfrm>
+            <a:off x="3884613" y="0"/>
+            <a:ext cx="2971800" cy="458788"/>
+          </a:xfrm>
+          <a:prstGeom prst="rect">
+            <a:avLst/>
+          </a:prstGeom>
+        </p:spPr>
+        <p:txBody>
+          <a:bodyPr vert="horz" lIns="91440" tIns="45720" rIns="91440" bIns="45720" rtlCol="0"/>
+          <a:lstStyle>
+            <a:lvl1pPr algn="r">
+              <a:defRPr sz="1200"/>
+            </a:lvl1pPr>
+          </a:lstStyle>
+          <a:p>
+            <a:fld id="{D2FA8770-CA3E-4D67-9458-6C1D2B52494F}" type="datetimeFigureOut">
+              <a:rPr lang="fil-PH" smtClean="0"/>
+              <a:t>4/14/2017</a:t>
+            </a:fld>
+            <a:endParaRPr lang="fil-PH"/>
+          </a:p>
+        </p:txBody>
+      </p:sp>
+      <p:sp>
+        <p:nvSpPr>
+          <p:cNvPr id="4" name="Slide Image Placeholder 3"/>
+          <p:cNvSpPr>
+            <a:spLocks noGrp="1" noRot="1" noChangeAspect="1"/>
+          </p:cNvSpPr>
+          <p:nvPr>
+            <p:ph type="sldImg" idx="2"/>
+          </p:nvPr>
+        </p:nvSpPr>
+        <p:spPr>
+          <a:xfrm>
+            <a:off x="685800" y="1143000"/>
+            <a:ext cx="5486400" cy="3086100"/>
+          </a:xfrm>
+          <a:prstGeom prst="rect">
+            <a:avLst/>
+          </a:prstGeom>
+          <a:noFill/>
+          <a:ln w="12700">
+            <a:solidFill>
+              <a:prstClr val="black"/>
+            </a:solidFill>
+          </a:ln>
+        </p:spPr>
+        <p:txBody>
+          <a:bodyPr vert="horz" lIns="91440" tIns="45720" rIns="91440" bIns="45720" rtlCol="0" anchor="ctr"/>
+          <a:lstStyle/>
+          <a:p>
+            <a:endParaRPr lang="fil-PH"/>
+          </a:p>
+        </p:txBody>
+      </p:sp>
+      <p:sp>
+        <p:nvSpPr>
+          <p:cNvPr id="5" name="Notes Placeholder 4"/>
+          <p:cNvSpPr>
+            <a:spLocks noGrp="1"/>
+          </p:cNvSpPr>
+          <p:nvPr>
+            <p:ph type="body" sz="quarter" idx="3"/>
+          </p:nvPr>
+        </p:nvSpPr>
+        <p:spPr>
+          <a:xfrm>
+            <a:off x="685800" y="4400550"/>
+            <a:ext cx="5486400" cy="3600450"/>
+          </a:xfrm>
+          <a:prstGeom prst="rect">
+            <a:avLst/>
+          </a:prstGeom>
+        </p:spPr>
+        <p:txBody>
+          <a:bodyPr vert="horz" lIns="91440" tIns="45720" rIns="91440" bIns="45720" rtlCol="0"/>
+          <a:lstStyle/>
+          <a:p>
+            <a:pPr lvl="0"/>
+            <a:r>
+              <a:rPr lang="en-US" smtClean="0"/>
+              <a:t>Click to edit Master text styles</a:t>
+            </a:r>
+          </a:p>
+          <a:p>
+            <a:pPr lvl="1"/>
+            <a:r>
+              <a:rPr lang="en-US" smtClean="0"/>
+              <a:t>Second level</a:t>
+            </a:r>
+          </a:p>
+          <a:p>
+            <a:pPr lvl="2"/>
+            <a:r>
+              <a:rPr lang="en-US" smtClean="0"/>
+              <a:t>Third level</a:t>
+            </a:r>
+          </a:p>
+          <a:p>
+            <a:pPr lvl="3"/>
+            <a:r>
+              <a:rPr lang="en-US" smtClean="0"/>
+              <a:t>Fourth level</a:t>
+            </a:r>
+          </a:p>
+          <a:p>
+            <a:pPr lvl="4"/>
+            <a:r>
+              <a:rPr lang="en-US" smtClean="0"/>
+              <a:t>Fifth level</a:t>
+            </a:r>
+            <a:endParaRPr lang="fil-PH"/>
+          </a:p>
+        </p:txBody>
+      </p:sp>
+      <p:sp>
+        <p:nvSpPr>
+          <p:cNvPr id="6" name="Footer Placeholder 5"/>
+          <p:cNvSpPr>
+            <a:spLocks noGrp="1"/>
+          </p:cNvSpPr>
+          <p:nvPr>
+            <p:ph type="ftr" sz="quarter" idx="4"/>
+          </p:nvPr>
+        </p:nvSpPr>
+        <p:spPr>
+          <a:xfrm>
+            <a:off x="0" y="8685213"/>
+            <a:ext cx="2971800" cy="458787"/>
+          </a:xfrm>
+          <a:prstGeom prst="rect">
+            <a:avLst/>
+          </a:prstGeom>
+        </p:spPr>
+        <p:txBody>
+          <a:bodyPr vert="horz" lIns="91440" tIns="45720" rIns="91440" bIns="45720" rtlCol="0" anchor="b"/>
+          <a:lstStyle>
+            <a:lvl1pPr algn="l">
+              <a:defRPr sz="1200"/>
+            </a:lvl1pPr>
+          </a:lstStyle>
+          <a:p>
+            <a:endParaRPr lang="fil-PH"/>
+          </a:p>
+        </p:txBody>
+      </p:sp>
+      <p:sp>
+        <p:nvSpPr>
+          <p:cNvPr id="7" name="Slide Number Placeholder 6"/>
+          <p:cNvSpPr>
+            <a:spLocks noGrp="1"/>
+          </p:cNvSpPr>
+          <p:nvPr>
+            <p:ph type="sldNum" sz="quarter" idx="5"/>
+          </p:nvPr>
+        </p:nvSpPr>
+        <p:spPr>
+          <a:xfrm>
+            <a:off x="3884613" y="8685213"/>
+            <a:ext cx="2971800" cy="458787"/>
+          </a:xfrm>
+          <a:prstGeom prst="rect">
+            <a:avLst/>
+          </a:prstGeom>
+        </p:spPr>
+        <p:txBody>
+          <a:bodyPr vert="horz" lIns="91440" tIns="45720" rIns="91440" bIns="45720" rtlCol="0" anchor="b"/>
+          <a:lstStyle>
+            <a:lvl1pPr algn="r">
+              <a:defRPr sz="1200"/>
+            </a:lvl1pPr>
+          </a:lstStyle>
+          <a:p>
+            <a:fld id="{E35082E1-2ECF-41F4-9F70-63946E0F9778}" type="slidenum">
+              <a:rPr lang="fil-PH" smtClean="0"/>
+              <a:t>‹#›</a:t>
+            </a:fld>
+            <a:endParaRPr lang="fil-PH"/>
+          </a:p>
+        </p:txBody>
+      </p:sp>
+    </p:spTree>
+    <p:extLst>
+      <p:ext uri="{BB962C8B-B14F-4D97-AF65-F5344CB8AC3E}">
+        <p14:creationId xmlns:p14="http://schemas.microsoft.com/office/powerpoint/2010/main" val="2563490745"/>
+      </p:ext>
+    </p:extLst>
+  </p:cSld>
+  <p:clrMap bg1="lt1" tx1="dk1" bg2="lt2" tx2="dk2" accent1="accent1" accent2="accent2" accent3="accent3" accent4="accent4" accent5="accent5" accent6="accent6" hlink="hlink" folHlink="folHlink"/>
+  <p:notesStyle>
+    <a:lvl1pPr marL="0" algn="l" defTabSz="914400" rtl="0" eaLnBrk="1" latinLnBrk="0" hangingPunct="1">
+      <a:defRPr sz="1200" kern="1200">
+        <a:solidFill>
+          <a:schemeClr val="tx1"/>
+        </a:solidFill>
+        <a:latin typeface="+mn-lt"/>
+        <a:ea typeface="+mn-ea"/>
+        <a:cs typeface="+mn-cs"/>
+      </a:defRPr>
+    </a:lvl1pPr>
+    <a:lvl2pPr marL="457200" algn="l" defTabSz="914400" rtl="0" eaLnBrk="1" latinLnBrk="0" hangingPunct="1">
+      <a:defRPr sz="1200" kern="1200">
+        <a:solidFill>
+          <a:schemeClr val="tx1"/>
+        </a:solidFill>
+        <a:latin typeface="+mn-lt"/>
+        <a:ea typeface="+mn-ea"/>
+        <a:cs typeface="+mn-cs"/>
+      </a:defRPr>
+    </a:lvl2pPr>
+    <a:lvl3pPr marL="914400" algn="l" defTabSz="914400" rtl="0" eaLnBrk="1" latinLnBrk="0" hangingPunct="1">
+      <a:defRPr sz="1200" kern="1200">
+        <a:solidFill>
+          <a:schemeClr val="tx1"/>
+        </a:solidFill>
+        <a:latin typeface="+mn-lt"/>
+        <a:ea typeface="+mn-ea"/>
+        <a:cs typeface="+mn-cs"/>
+      </a:defRPr>
+    </a:lvl3pPr>
+    <a:lvl4pPr marL="1371600" algn="l" defTabSz="914400" rtl="0" eaLnBrk="1" latinLnBrk="0" hangingPunct="1">
+      <a:defRPr sz="1200" kern="1200">
+        <a:solidFill>
+          <a:schemeClr val="tx1"/>
+        </a:solidFill>
+        <a:latin typeface="+mn-lt"/>
+        <a:ea typeface="+mn-ea"/>
+        <a:cs typeface="+mn-cs"/>
+      </a:defRPr>
+    </a:lvl4pPr>
+    <a:lvl5pPr marL="1828800" algn="l" defTabSz="914400" rtl="0" eaLnBrk="1" latinLnBrk="0" hangingPunct="1">
+      <a:defRPr sz="1200" kern="1200">
+        <a:solidFill>
+          <a:schemeClr val="tx1"/>
+        </a:solidFill>
+        <a:latin typeface="+mn-lt"/>
+        <a:ea typeface="+mn-ea"/>
+        <a:cs typeface="+mn-cs"/>
+      </a:defRPr>
+    </a:lvl5pPr>
+    <a:lvl6pPr marL="2286000" algn="l" defTabSz="914400" rtl="0" eaLnBrk="1" latinLnBrk="0" hangingPunct="1">
+      <a:defRPr sz="1200" kern="1200">
+        <a:solidFill>
+          <a:schemeClr val="tx1"/>
+        </a:solidFill>
+        <a:latin typeface="+mn-lt"/>
+        <a:ea typeface="+mn-ea"/>
+        <a:cs typeface="+mn-cs"/>
+      </a:defRPr>
+    </a:lvl6pPr>
+    <a:lvl7pPr marL="2743200" algn="l" defTabSz="914400" rtl="0" eaLnBrk="1" latinLnBrk="0" hangingPunct="1">
+      <a:defRPr sz="1200" kern="1200">
+        <a:solidFill>
+          <a:schemeClr val="tx1"/>
+        </a:solidFill>
+        <a:latin typeface="+mn-lt"/>
+        <a:ea typeface="+mn-ea"/>
+        <a:cs typeface="+mn-cs"/>
+      </a:defRPr>
+    </a:lvl7pPr>
+    <a:lvl8pPr marL="3200400" algn="l" defTabSz="914400" rtl="0" eaLnBrk="1" latinLnBrk="0" hangingPunct="1">
+      <a:defRPr sz="1200" kern="1200">
+        <a:solidFill>
+          <a:schemeClr val="tx1"/>
+        </a:solidFill>
+        <a:latin typeface="+mn-lt"/>
+        <a:ea typeface="+mn-ea"/>
+        <a:cs typeface="+mn-cs"/>
+      </a:defRPr>
+    </a:lvl8pPr>
+    <a:lvl9pPr marL="3657600" algn="l" defTabSz="914400" rtl="0" eaLnBrk="1" latinLnBrk="0" hangingPunct="1">
+      <a:defRPr sz="1200" kern="1200">
+        <a:solidFill>
+          <a:schemeClr val="tx1"/>
+        </a:solidFill>
+        <a:latin typeface="+mn-lt"/>
+        <a:ea typeface="+mn-ea"/>
+        <a:cs typeface="+mn-cs"/>
+      </a:defRPr>
+    </a:lvl9pPr>
+  </p:notesStyle>
+</p:notesMaster>
+</file>
+
+<file path=ppt/notesSlides/notesSlide1.xml><?xml version="1.0" encoding="utf-8"?>
+<p:notes xmlns:a="http://schemas.openxmlformats.org/drawingml/2006/main" xmlns:r="http://schemas.openxmlformats.org/officeDocument/2006/relationships" xmlns:p="http://schemas.openxmlformats.org/presentationml/2006/main">
+  <p:cSld>
+    <p:spTree>
+      <p:nvGrpSpPr>
+        <p:cNvPr id="1" name=""/>
+        <p:cNvGrpSpPr/>
+        <p:nvPr/>
+      </p:nvGrpSpPr>
+      <p:grpSpPr>
+        <a:xfrm>
+          <a:off x="0" y="0"/>
+          <a:ext cx="0" cy="0"/>
+          <a:chOff x="0" y="0"/>
+          <a:chExt cx="0" cy="0"/>
+        </a:xfrm>
+      </p:grpSpPr>
+      <p:sp>
+        <p:nvSpPr>
+          <p:cNvPr id="2" name="Slide Image Placeholder 1"/>
+          <p:cNvSpPr>
+            <a:spLocks noGrp="1" noRot="1" noChangeAspect="1"/>
+          </p:cNvSpPr>
+          <p:nvPr>
+            <p:ph type="sldImg"/>
+          </p:nvPr>
+        </p:nvSpPr>
+        <p:spPr/>
+      </p:sp>
+      <p:sp>
+        <p:nvSpPr>
+          <p:cNvPr id="3" name="Notes Placeholder 2"/>
+          <p:cNvSpPr>
+            <a:spLocks noGrp="1"/>
+          </p:cNvSpPr>
+          <p:nvPr>
+            <p:ph type="body" idx="1"/>
+          </p:nvPr>
+        </p:nvSpPr>
+        <p:spPr/>
+        <p:txBody>
+          <a:bodyPr/>
+          <a:lstStyle/>
+          <a:p>
+            <a:r>
+              <a:rPr lang="en-PH" dirty="0" smtClean="0"/>
+              <a:t>Next slides</a:t>
+            </a:r>
+            <a:r>
+              <a:rPr lang="en-PH" baseline="0" dirty="0" smtClean="0"/>
+              <a:t> will consist of screenshots for the different version control systems, starting with CVS.</a:t>
+            </a:r>
+            <a:endParaRPr lang="fil-PH" dirty="0"/>
+          </a:p>
+        </p:txBody>
+      </p:sp>
+      <p:sp>
+        <p:nvSpPr>
+          <p:cNvPr id="4" name="Slide Number Placeholder 3"/>
+          <p:cNvSpPr>
+            <a:spLocks noGrp="1"/>
+          </p:cNvSpPr>
+          <p:nvPr>
+            <p:ph type="sldNum" sz="quarter" idx="10"/>
+          </p:nvPr>
+        </p:nvSpPr>
+        <p:spPr/>
+        <p:txBody>
+          <a:bodyPr/>
+          <a:lstStyle/>
+          <a:p>
+            <a:fld id="{E35082E1-2ECF-41F4-9F70-63946E0F9778}" type="slidenum">
+              <a:rPr lang="fil-PH" smtClean="0"/>
+              <a:t>4</a:t>
+            </a:fld>
+            <a:endParaRPr lang="fil-PH"/>
+          </a:p>
+        </p:txBody>
+      </p:sp>
+    </p:spTree>
+    <p:extLst>
+      <p:ext uri="{BB962C8B-B14F-4D97-AF65-F5344CB8AC3E}">
+        <p14:creationId xmlns:p14="http://schemas.microsoft.com/office/powerpoint/2010/main" val="1691943731"/>
+      </p:ext>
+    </p:extLst>
+  </p:cSld>
+  <p:clrMapOvr>
+    <a:masterClrMapping/>
+  </p:clrMapOvr>
+</p:notes>
+</file>
+
+<file path=ppt/notesSlides/notesSlide2.xml><?xml version="1.0" encoding="utf-8"?>
+<p:notes xmlns:a="http://schemas.openxmlformats.org/drawingml/2006/main" xmlns:r="http://schemas.openxmlformats.org/officeDocument/2006/relationships" xmlns:p="http://schemas.openxmlformats.org/presentationml/2006/main">
+  <p:cSld>
+    <p:spTree>
+      <p:nvGrpSpPr>
+        <p:cNvPr id="1" name=""/>
+        <p:cNvGrpSpPr/>
+        <p:nvPr/>
+      </p:nvGrpSpPr>
+      <p:grpSpPr>
+        <a:xfrm>
+          <a:off x="0" y="0"/>
+          <a:ext cx="0" cy="0"/>
+          <a:chOff x="0" y="0"/>
+          <a:chExt cx="0" cy="0"/>
+        </a:xfrm>
+      </p:grpSpPr>
+      <p:sp>
+        <p:nvSpPr>
+          <p:cNvPr id="2" name="Slide Image Placeholder 1"/>
+          <p:cNvSpPr>
+            <a:spLocks noGrp="1" noRot="1" noChangeAspect="1"/>
+          </p:cNvSpPr>
+          <p:nvPr>
+            <p:ph type="sldImg"/>
+          </p:nvPr>
+        </p:nvSpPr>
+        <p:spPr/>
+      </p:sp>
+      <p:sp>
+        <p:nvSpPr>
+          <p:cNvPr id="3" name="Notes Placeholder 2"/>
+          <p:cNvSpPr>
+            <a:spLocks noGrp="1"/>
+          </p:cNvSpPr>
+          <p:nvPr>
+            <p:ph type="body" idx="1"/>
+          </p:nvPr>
+        </p:nvSpPr>
+        <p:spPr/>
+        <p:txBody>
+          <a:bodyPr/>
+          <a:lstStyle/>
+          <a:p>
+            <a:r>
+              <a:rPr lang="en-PH" dirty="0" smtClean="0"/>
+              <a:t>Next slide</a:t>
+            </a:r>
+            <a:r>
+              <a:rPr lang="en-PH" baseline="0" dirty="0" smtClean="0"/>
+              <a:t> will be SVN commands screenshot.</a:t>
+            </a:r>
+            <a:endParaRPr lang="fil-PH" dirty="0"/>
+          </a:p>
+        </p:txBody>
+      </p:sp>
+      <p:sp>
+        <p:nvSpPr>
+          <p:cNvPr id="4" name="Slide Number Placeholder 3"/>
+          <p:cNvSpPr>
+            <a:spLocks noGrp="1"/>
+          </p:cNvSpPr>
+          <p:nvPr>
+            <p:ph type="sldNum" sz="quarter" idx="10"/>
+          </p:nvPr>
+        </p:nvSpPr>
+        <p:spPr/>
+        <p:txBody>
+          <a:bodyPr/>
+          <a:lstStyle/>
+          <a:p>
+            <a:fld id="{E35082E1-2ECF-41F4-9F70-63946E0F9778}" type="slidenum">
+              <a:rPr lang="fil-PH" smtClean="0"/>
+              <a:t>5</a:t>
+            </a:fld>
+            <a:endParaRPr lang="fil-PH"/>
+          </a:p>
+        </p:txBody>
+      </p:sp>
+    </p:spTree>
+    <p:extLst>
+      <p:ext uri="{BB962C8B-B14F-4D97-AF65-F5344CB8AC3E}">
+        <p14:creationId xmlns:p14="http://schemas.microsoft.com/office/powerpoint/2010/main" val="3741021901"/>
+      </p:ext>
+    </p:extLst>
+  </p:cSld>
+  <p:clrMapOvr>
+    <a:masterClrMapping/>
+  </p:clrMapOvr>
+</p:notes>
+</file>
+
+<file path=ppt/notesSlides/notesSlide3.xml><?xml version="1.0" encoding="utf-8"?>
+<p:notes xmlns:a="http://schemas.openxmlformats.org/drawingml/2006/main" xmlns:r="http://schemas.openxmlformats.org/officeDocument/2006/relationships" xmlns:p="http://schemas.openxmlformats.org/presentationml/2006/main">
+  <p:cSld>
+    <p:spTree>
+      <p:nvGrpSpPr>
+        <p:cNvPr id="1" name=""/>
+        <p:cNvGrpSpPr/>
+        <p:nvPr/>
+      </p:nvGrpSpPr>
+      <p:grpSpPr>
+        <a:xfrm>
+          <a:off x="0" y="0"/>
+          <a:ext cx="0" cy="0"/>
+          <a:chOff x="0" y="0"/>
+          <a:chExt cx="0" cy="0"/>
+        </a:xfrm>
+      </p:grpSpPr>
+      <p:sp>
+        <p:nvSpPr>
+          <p:cNvPr id="2" name="Slide Image Placeholder 1"/>
+          <p:cNvSpPr>
+            <a:spLocks noGrp="1" noRot="1" noChangeAspect="1"/>
+          </p:cNvSpPr>
+          <p:nvPr>
+            <p:ph type="sldImg"/>
+          </p:nvPr>
+        </p:nvSpPr>
+        <p:spPr/>
+      </p:sp>
+      <p:sp>
+        <p:nvSpPr>
+          <p:cNvPr id="3" name="Notes Placeholder 2"/>
+          <p:cNvSpPr>
+            <a:spLocks noGrp="1"/>
+          </p:cNvSpPr>
+          <p:nvPr>
+            <p:ph type="body" idx="1"/>
+          </p:nvPr>
+        </p:nvSpPr>
+        <p:spPr/>
+        <p:txBody>
+          <a:bodyPr/>
+          <a:lstStyle/>
+          <a:p>
+            <a:r>
+              <a:rPr lang="en-PH" dirty="0" smtClean="0"/>
+              <a:t>Next slide will be SVN logs screenshot.</a:t>
+            </a:r>
+            <a:endParaRPr lang="fil-PH" dirty="0"/>
+          </a:p>
+        </p:txBody>
+      </p:sp>
+      <p:sp>
+        <p:nvSpPr>
+          <p:cNvPr id="4" name="Slide Number Placeholder 3"/>
+          <p:cNvSpPr>
+            <a:spLocks noGrp="1"/>
+          </p:cNvSpPr>
+          <p:nvPr>
+            <p:ph type="sldNum" sz="quarter" idx="10"/>
+          </p:nvPr>
+        </p:nvSpPr>
+        <p:spPr/>
+        <p:txBody>
+          <a:bodyPr/>
+          <a:lstStyle/>
+          <a:p>
+            <a:fld id="{E35082E1-2ECF-41F4-9F70-63946E0F9778}" type="slidenum">
+              <a:rPr lang="fil-PH" smtClean="0"/>
+              <a:t>6</a:t>
+            </a:fld>
+            <a:endParaRPr lang="fil-PH"/>
+          </a:p>
+        </p:txBody>
+      </p:sp>
+    </p:spTree>
+    <p:extLst>
+      <p:ext uri="{BB962C8B-B14F-4D97-AF65-F5344CB8AC3E}">
+        <p14:creationId xmlns:p14="http://schemas.microsoft.com/office/powerpoint/2010/main" val="1970798201"/>
+      </p:ext>
+    </p:extLst>
+  </p:cSld>
+  <p:clrMapOvr>
+    <a:masterClrMapping/>
+  </p:clrMapOvr>
+</p:notes>
+</file>
+
+<file path=ppt/notesSlides/notesSlide4.xml><?xml version="1.0" encoding="utf-8"?>
+<p:notes xmlns:a="http://schemas.openxmlformats.org/drawingml/2006/main" xmlns:r="http://schemas.openxmlformats.org/officeDocument/2006/relationships" xmlns:p="http://schemas.openxmlformats.org/presentationml/2006/main">
+  <p:cSld>
+    <p:spTree>
+      <p:nvGrpSpPr>
+        <p:cNvPr id="1" name=""/>
+        <p:cNvGrpSpPr/>
+        <p:nvPr/>
+      </p:nvGrpSpPr>
+      <p:grpSpPr>
+        <a:xfrm>
+          <a:off x="0" y="0"/>
+          <a:ext cx="0" cy="0"/>
+          <a:chOff x="0" y="0"/>
+          <a:chExt cx="0" cy="0"/>
+        </a:xfrm>
+      </p:grpSpPr>
+      <p:sp>
+        <p:nvSpPr>
+          <p:cNvPr id="2" name="Slide Image Placeholder 1"/>
+          <p:cNvSpPr>
+            <a:spLocks noGrp="1" noRot="1" noChangeAspect="1"/>
+          </p:cNvSpPr>
+          <p:nvPr>
+            <p:ph type="sldImg"/>
+          </p:nvPr>
+        </p:nvSpPr>
+        <p:spPr/>
+      </p:sp>
+      <p:sp>
+        <p:nvSpPr>
+          <p:cNvPr id="3" name="Notes Placeholder 2"/>
+          <p:cNvSpPr>
+            <a:spLocks noGrp="1"/>
+          </p:cNvSpPr>
+          <p:nvPr>
+            <p:ph type="body" idx="1"/>
+          </p:nvPr>
+        </p:nvSpPr>
+        <p:spPr/>
+        <p:txBody>
+          <a:bodyPr/>
+          <a:lstStyle/>
+          <a:p>
+            <a:r>
+              <a:rPr lang="en-PH" dirty="0" smtClean="0"/>
+              <a:t>Next slide will</a:t>
+            </a:r>
+            <a:r>
+              <a:rPr lang="en-PH" baseline="0" dirty="0" smtClean="0"/>
+              <a:t> be screenshot of </a:t>
+            </a:r>
+            <a:r>
+              <a:rPr lang="en-PH" baseline="0" dirty="0" err="1" smtClean="0"/>
+              <a:t>Git</a:t>
+            </a:r>
+            <a:r>
+              <a:rPr lang="en-PH" baseline="0" dirty="0" smtClean="0"/>
+              <a:t> bash.</a:t>
+            </a:r>
+            <a:endParaRPr lang="fil-PH" dirty="0"/>
+          </a:p>
+        </p:txBody>
+      </p:sp>
+      <p:sp>
+        <p:nvSpPr>
+          <p:cNvPr id="4" name="Slide Number Placeholder 3"/>
+          <p:cNvSpPr>
+            <a:spLocks noGrp="1"/>
+          </p:cNvSpPr>
+          <p:nvPr>
+            <p:ph type="sldNum" sz="quarter" idx="10"/>
+          </p:nvPr>
+        </p:nvSpPr>
+        <p:spPr/>
+        <p:txBody>
+          <a:bodyPr/>
+          <a:lstStyle/>
+          <a:p>
+            <a:fld id="{E35082E1-2ECF-41F4-9F70-63946E0F9778}" type="slidenum">
+              <a:rPr lang="fil-PH" smtClean="0"/>
+              <a:t>7</a:t>
+            </a:fld>
+            <a:endParaRPr lang="fil-PH"/>
+          </a:p>
+        </p:txBody>
+      </p:sp>
+    </p:spTree>
+    <p:extLst>
+      <p:ext uri="{BB962C8B-B14F-4D97-AF65-F5344CB8AC3E}">
+        <p14:creationId xmlns:p14="http://schemas.microsoft.com/office/powerpoint/2010/main" val="4046118941"/>
+      </p:ext>
+    </p:extLst>
+  </p:cSld>
+  <p:clrMapOvr>
+    <a:masterClrMapping/>
+  </p:clrMapOvr>
+</p:notes>
+</file>
+
+<file path=ppt/notesSlides/notesSlide5.xml><?xml version="1.0" encoding="utf-8"?>
+<p:notes xmlns:a="http://schemas.openxmlformats.org/drawingml/2006/main" xmlns:r="http://schemas.openxmlformats.org/officeDocument/2006/relationships" xmlns:p="http://schemas.openxmlformats.org/presentationml/2006/main">
+  <p:cSld>
+    <p:spTree>
+      <p:nvGrpSpPr>
+        <p:cNvPr id="1" name=""/>
+        <p:cNvGrpSpPr/>
+        <p:nvPr/>
+      </p:nvGrpSpPr>
+      <p:grpSpPr>
+        <a:xfrm>
+          <a:off x="0" y="0"/>
+          <a:ext cx="0" cy="0"/>
+          <a:chOff x="0" y="0"/>
+          <a:chExt cx="0" cy="0"/>
+        </a:xfrm>
+      </p:grpSpPr>
+      <p:sp>
+        <p:nvSpPr>
+          <p:cNvPr id="2" name="Slide Image Placeholder 1"/>
+          <p:cNvSpPr>
+            <a:spLocks noGrp="1" noRot="1" noChangeAspect="1"/>
+          </p:cNvSpPr>
+          <p:nvPr>
+            <p:ph type="sldImg"/>
+          </p:nvPr>
+        </p:nvSpPr>
+        <p:spPr/>
+      </p:sp>
+      <p:sp>
+        <p:nvSpPr>
+          <p:cNvPr id="3" name="Notes Placeholder 2"/>
+          <p:cNvSpPr>
+            <a:spLocks noGrp="1"/>
+          </p:cNvSpPr>
+          <p:nvPr>
+            <p:ph type="body" idx="1"/>
+          </p:nvPr>
+        </p:nvSpPr>
+        <p:spPr/>
+        <p:txBody>
+          <a:bodyPr/>
+          <a:lstStyle/>
+          <a:p>
+            <a:r>
+              <a:rPr lang="en-PH" dirty="0" smtClean="0"/>
+              <a:t>Next slide will be common commands in version</a:t>
+            </a:r>
+            <a:r>
+              <a:rPr lang="en-PH" baseline="0" dirty="0" smtClean="0"/>
+              <a:t> control systems and what they do.</a:t>
+            </a:r>
+            <a:endParaRPr lang="fil-PH" dirty="0"/>
+          </a:p>
+        </p:txBody>
+      </p:sp>
+      <p:sp>
+        <p:nvSpPr>
+          <p:cNvPr id="4" name="Slide Number Placeholder 3"/>
+          <p:cNvSpPr>
+            <a:spLocks noGrp="1"/>
+          </p:cNvSpPr>
+          <p:nvPr>
+            <p:ph type="sldNum" sz="quarter" idx="10"/>
+          </p:nvPr>
+        </p:nvSpPr>
+        <p:spPr/>
+        <p:txBody>
+          <a:bodyPr/>
+          <a:lstStyle/>
+          <a:p>
+            <a:fld id="{E35082E1-2ECF-41F4-9F70-63946E0F9778}" type="slidenum">
+              <a:rPr lang="fil-PH" smtClean="0"/>
+              <a:t>8</a:t>
+            </a:fld>
+            <a:endParaRPr lang="fil-PH"/>
+          </a:p>
+        </p:txBody>
+      </p:sp>
+    </p:spTree>
+    <p:extLst>
+      <p:ext uri="{BB962C8B-B14F-4D97-AF65-F5344CB8AC3E}">
+        <p14:creationId xmlns:p14="http://schemas.microsoft.com/office/powerpoint/2010/main" val="2341228345"/>
+      </p:ext>
+    </p:extLst>
+  </p:cSld>
+  <p:clrMapOvr>
+    <a:masterClrMapping/>
+  </p:clrMapOvr>
+</p:notes>
 </file>
 
 <file path=ppt/slideLayouts/slideLayout1.xml><?xml version="1.0" encoding="utf-8"?>
@@ -240,7 +1068,7 @@
           <a:p>
             <a:fld id="{84AB6E80-339A-4629-8279-03CD7828950D}" type="datetimeFigureOut">
               <a:rPr lang="en-PH" smtClean="0"/>
-              <a:t>08/04/2017</a:t>
+              <a:t>14/04/2017</a:t>
             </a:fld>
             <a:endParaRPr lang="en-PH"/>
           </a:p>
@@ -410,7 +1238,7 @@
           <a:p>
             <a:fld id="{84AB6E80-339A-4629-8279-03CD7828950D}" type="datetimeFigureOut">
               <a:rPr lang="en-PH" smtClean="0"/>
-              <a:t>08/04/2017</a:t>
+              <a:t>14/04/2017</a:t>
             </a:fld>
             <a:endParaRPr lang="en-PH"/>
           </a:p>
@@ -590,7 +1418,7 @@
           <a:p>
             <a:fld id="{84AB6E80-339A-4629-8279-03CD7828950D}" type="datetimeFigureOut">
               <a:rPr lang="en-PH" smtClean="0"/>
-              <a:t>08/04/2017</a:t>
+              <a:t>14/04/2017</a:t>
             </a:fld>
             <a:endParaRPr lang="en-PH"/>
           </a:p>
@@ -760,7 +1588,7 @@
           <a:p>
             <a:fld id="{84AB6E80-339A-4629-8279-03CD7828950D}" type="datetimeFigureOut">
               <a:rPr lang="en-PH" smtClean="0"/>
-              <a:t>08/04/2017</a:t>
+              <a:t>14/04/2017</a:t>
             </a:fld>
             <a:endParaRPr lang="en-PH"/>
           </a:p>
@@ -1006,7 +1834,7 @@
           <a:p>
             <a:fld id="{84AB6E80-339A-4629-8279-03CD7828950D}" type="datetimeFigureOut">
               <a:rPr lang="en-PH" smtClean="0"/>
-              <a:t>08/04/2017</a:t>
+              <a:t>14/04/2017</a:t>
             </a:fld>
             <a:endParaRPr lang="en-PH"/>
           </a:p>
@@ -1238,7 +2066,7 @@
           <a:p>
             <a:fld id="{84AB6E80-339A-4629-8279-03CD7828950D}" type="datetimeFigureOut">
               <a:rPr lang="en-PH" smtClean="0"/>
-              <a:t>08/04/2017</a:t>
+              <a:t>14/04/2017</a:t>
             </a:fld>
             <a:endParaRPr lang="en-PH"/>
           </a:p>
@@ -1605,7 +2433,7 @@
           <a:p>
             <a:fld id="{84AB6E80-339A-4629-8279-03CD7828950D}" type="datetimeFigureOut">
               <a:rPr lang="en-PH" smtClean="0"/>
-              <a:t>08/04/2017</a:t>
+              <a:t>14/04/2017</a:t>
             </a:fld>
             <a:endParaRPr lang="en-PH"/>
           </a:p>
@@ -1723,7 +2551,7 @@
           <a:p>
             <a:fld id="{84AB6E80-339A-4629-8279-03CD7828950D}" type="datetimeFigureOut">
               <a:rPr lang="en-PH" smtClean="0"/>
-              <a:t>08/04/2017</a:t>
+              <a:t>14/04/2017</a:t>
             </a:fld>
             <a:endParaRPr lang="en-PH"/>
           </a:p>
@@ -1818,7 +2646,7 @@
           <a:p>
             <a:fld id="{84AB6E80-339A-4629-8279-03CD7828950D}" type="datetimeFigureOut">
               <a:rPr lang="en-PH" smtClean="0"/>
-              <a:t>08/04/2017</a:t>
+              <a:t>14/04/2017</a:t>
             </a:fld>
             <a:endParaRPr lang="en-PH"/>
           </a:p>
@@ -2095,7 +2923,7 @@
           <a:p>
             <a:fld id="{84AB6E80-339A-4629-8279-03CD7828950D}" type="datetimeFigureOut">
               <a:rPr lang="en-PH" smtClean="0"/>
-              <a:t>08/04/2017</a:t>
+              <a:t>14/04/2017</a:t>
             </a:fld>
             <a:endParaRPr lang="en-PH"/>
           </a:p>
@@ -2348,7 +3176,7 @@
           <a:p>
             <a:fld id="{84AB6E80-339A-4629-8279-03CD7828950D}" type="datetimeFigureOut">
               <a:rPr lang="en-PH" smtClean="0"/>
-              <a:t>08/04/2017</a:t>
+              <a:t>14/04/2017</a:t>
             </a:fld>
             <a:endParaRPr lang="en-PH"/>
           </a:p>
@@ -2561,7 +3389,7 @@
           <a:p>
             <a:fld id="{84AB6E80-339A-4629-8279-03CD7828950D}" type="datetimeFigureOut">
               <a:rPr lang="en-PH" smtClean="0"/>
-              <a:t>08/04/2017</a:t>
+              <a:t>14/04/2017</a:t>
             </a:fld>
             <a:endParaRPr lang="en-PH"/>
           </a:p>
@@ -2976,7 +3804,12 @@
             <p:ph type="ctrTitle"/>
           </p:nvPr>
         </p:nvSpPr>
-        <p:spPr/>
+        <p:spPr>
+          <a:xfrm>
+            <a:off x="1524000" y="2578443"/>
+            <a:ext cx="9144000" cy="931520"/>
+          </a:xfrm>
+        </p:spPr>
         <p:txBody>
           <a:bodyPr/>
           <a:lstStyle/>
@@ -2985,6 +3818,89 @@
               <a:rPr lang="en-PH" dirty="0"/>
               <a:t>Agile Development</a:t>
             </a:r>
+          </a:p>
+        </p:txBody>
+      </p:sp>
+      <p:sp>
+        <p:nvSpPr>
+          <p:cNvPr id="3" name="TextBox 2"/>
+          <p:cNvSpPr txBox="1"/>
+          <p:nvPr/>
+        </p:nvSpPr>
+        <p:spPr>
+          <a:xfrm>
+            <a:off x="222421" y="6030098"/>
+            <a:ext cx="4852086" cy="646331"/>
+          </a:xfrm>
+          <a:prstGeom prst="rect">
+            <a:avLst/>
+          </a:prstGeom>
+          <a:noFill/>
+        </p:spPr>
+        <p:txBody>
+          <a:bodyPr wrap="square" rtlCol="0">
+            <a:spAutoFit/>
+          </a:bodyPr>
+          <a:lstStyle/>
+          <a:p>
+            <a:r>
+              <a:rPr lang="en-PH" dirty="0" err="1" smtClean="0"/>
+              <a:t>Cris</a:t>
+            </a:r>
+            <a:r>
+              <a:rPr lang="en-PH" dirty="0" smtClean="0"/>
+              <a:t> Ann </a:t>
+            </a:r>
+            <a:r>
+              <a:rPr lang="en-PH" dirty="0" err="1" smtClean="0"/>
+              <a:t>Rioflorido</a:t>
+            </a:r>
+            <a:endParaRPr lang="en-PH" dirty="0" smtClean="0"/>
+          </a:p>
+          <a:p>
+            <a:r>
+              <a:rPr lang="en-PH" i="1" dirty="0" smtClean="0"/>
+              <a:t>DEV-COL Team Leader / Software Developer</a:t>
+            </a:r>
+            <a:endParaRPr lang="fil-PH" i="1" dirty="0"/>
+          </a:p>
+        </p:txBody>
+      </p:sp>
+      <p:sp>
+        <p:nvSpPr>
+          <p:cNvPr id="4" name="TextBox 3"/>
+          <p:cNvSpPr txBox="1"/>
+          <p:nvPr/>
+        </p:nvSpPr>
+        <p:spPr>
+          <a:xfrm>
+            <a:off x="8270789" y="5753099"/>
+            <a:ext cx="3649362" cy="923330"/>
+          </a:xfrm>
+          <a:prstGeom prst="rect">
+            <a:avLst/>
+          </a:prstGeom>
+          <a:noFill/>
+        </p:spPr>
+        <p:txBody>
+          <a:bodyPr wrap="square" rtlCol="0">
+            <a:spAutoFit/>
+          </a:bodyPr>
+          <a:lstStyle/>
+          <a:p>
+            <a:pPr algn="just"/>
+            <a:r>
+              <a:rPr lang="en-PH" dirty="0" smtClean="0"/>
+              <a:t>Stephen Joe Cruz</a:t>
+            </a:r>
+          </a:p>
+          <a:p>
+            <a:pPr algn="just"/>
+            <a:r>
+              <a:rPr lang="en-PH" i="1" dirty="0" smtClean="0"/>
+              <a:t>DEV-COR Deputy Team Leader / Associate Software Developer</a:t>
+            </a:r>
+            <a:endParaRPr lang="fil-PH" i="1" dirty="0"/>
           </a:p>
         </p:txBody>
       </p:sp>
@@ -2998,6 +3914,13 @@
   <p:clrMapOvr>
     <a:masterClrMapping/>
   </p:clrMapOvr>
+  <p:timing>
+    <p:tnLst>
+      <p:par>
+        <p:cTn id="1" dur="indefinite" restart="never" nodeType="tmRoot"/>
+      </p:par>
+    </p:tnLst>
+  </p:timing>
 </p:sld>
 </file>
 
@@ -3028,70 +3951,89 @@
             <p:ph type="title"/>
           </p:nvPr>
         </p:nvSpPr>
-        <p:spPr/>
-        <p:txBody>
-          <a:bodyPr/>
+        <p:spPr>
+          <a:xfrm>
+            <a:off x="838200" y="391885"/>
+            <a:ext cx="10515600" cy="880791"/>
+          </a:xfrm>
+        </p:spPr>
+        <p:txBody>
+          <a:bodyPr>
+            <a:normAutofit/>
+          </a:bodyPr>
           <a:lstStyle/>
           <a:p>
             <a:pPr algn="ctr"/>
             <a:r>
+              <a:rPr lang="en-PH" sz="4000" dirty="0"/>
+              <a:t>Agile Manifesto</a:t>
+            </a:r>
+          </a:p>
+        </p:txBody>
+      </p:sp>
+      <p:sp>
+        <p:nvSpPr>
+          <p:cNvPr id="3" name="Content Placeholder 2"/>
+          <p:cNvSpPr>
+            <a:spLocks noGrp="1"/>
+          </p:cNvSpPr>
+          <p:nvPr>
+            <p:ph idx="1"/>
+          </p:nvPr>
+        </p:nvSpPr>
+        <p:spPr>
+          <a:xfrm>
+            <a:off x="838200" y="1546950"/>
+            <a:ext cx="10515600" cy="4351338"/>
+          </a:xfrm>
+        </p:spPr>
+        <p:txBody>
+          <a:bodyPr>
+            <a:noAutofit/>
+          </a:bodyPr>
+          <a:lstStyle/>
+          <a:p>
+            <a:pPr marL="0" indent="0">
+              <a:buNone/>
+            </a:pPr>
+            <a:r>
               <a:rPr lang="en-PH" dirty="0"/>
-              <a:t>Agile Manifesto</a:t>
-            </a:r>
-          </a:p>
-        </p:txBody>
-      </p:sp>
-      <p:sp>
-        <p:nvSpPr>
-          <p:cNvPr id="3" name="Content Placeholder 2"/>
-          <p:cNvSpPr>
-            <a:spLocks noGrp="1"/>
-          </p:cNvSpPr>
-          <p:nvPr>
-            <p:ph idx="1"/>
-          </p:nvPr>
-        </p:nvSpPr>
-        <p:spPr/>
-        <p:txBody>
-          <a:bodyPr>
-            <a:normAutofit fontScale="92500" lnSpcReduction="10000"/>
-          </a:bodyPr>
-          <a:lstStyle/>
-          <a:p>
-            <a:pPr marL="0" indent="0">
-              <a:buNone/>
-            </a:pPr>
-            <a:r>
-              <a:rPr lang="en-PH" dirty="0"/>
-              <a:t>We are uncovering better ways of developing software by doing it and helping others do it. Through this work, we have come to value:</a:t>
-            </a:r>
-          </a:p>
-          <a:p>
+              <a:t>We are uncovering better ways of developing software by doing it and helping others do it. Through this work, we have come to value</a:t>
+            </a:r>
+            <a:r>
+              <a:rPr lang="en-PH" dirty="0" smtClean="0"/>
+              <a:t>:</a:t>
+            </a:r>
             <a:endParaRPr lang="en-PH" dirty="0"/>
           </a:p>
           <a:p>
-            <a:r>
-              <a:rPr lang="en-PH" dirty="0"/>
+            <a:pPr lvl="1"/>
+            <a:r>
+              <a:rPr lang="en-PH" sz="2800" dirty="0"/>
               <a:t>Individuals and interactions over processes and tools</a:t>
             </a:r>
           </a:p>
           <a:p>
-            <a:r>
-              <a:rPr lang="en-PH" dirty="0"/>
+            <a:pPr lvl="1"/>
+            <a:r>
+              <a:rPr lang="en-PH" sz="2800" dirty="0"/>
               <a:t>Working software over comprehensive documentation</a:t>
             </a:r>
           </a:p>
           <a:p>
-            <a:r>
-              <a:rPr lang="en-PH" dirty="0"/>
+            <a:pPr lvl="1"/>
+            <a:r>
+              <a:rPr lang="en-PH" sz="2800" dirty="0"/>
               <a:t>Customer collaboration over contract negotiation</a:t>
             </a:r>
           </a:p>
           <a:p>
-            <a:r>
-              <a:rPr lang="en-PH" dirty="0"/>
+            <a:pPr lvl="1"/>
+            <a:r>
+              <a:rPr lang="en-PH" sz="2800" dirty="0"/>
               <a:t>Responding to change over following a plan</a:t>
             </a:r>
+            <a:endParaRPr lang="en-PH" dirty="0"/>
           </a:p>
           <a:p>
             <a:pPr marL="0" indent="0">
@@ -3107,6 +4049,7 @@
               <a:rPr lang="en-PH" dirty="0"/>
               <a:t>That is, while there is value in the items on the right, we value the items on the left more.</a:t>
             </a:r>
+            <a:endParaRPr lang="en-PH" sz="3200" dirty="0"/>
           </a:p>
         </p:txBody>
       </p:sp>
@@ -3120,6 +4063,13 @@
   <p:clrMapOvr>
     <a:masterClrMapping/>
   </p:clrMapOvr>
+  <p:timing>
+    <p:tnLst>
+      <p:par>
+        <p:cTn id="1" dur="indefinite" restart="never" nodeType="tmRoot"/>
+      </p:par>
+    </p:tnLst>
+  </p:timing>
 </p:sld>
 </file>
 
@@ -3157,12 +4107,14 @@
           </a:xfrm>
         </p:spPr>
         <p:txBody>
-          <a:bodyPr/>
+          <a:bodyPr>
+            <a:normAutofit/>
+          </a:bodyPr>
           <a:lstStyle/>
           <a:p>
             <a:pPr algn="ctr"/>
             <a:r>
-              <a:rPr lang="en-PH" dirty="0"/>
+              <a:rPr lang="en-PH" sz="4000" dirty="0"/>
               <a:t>The principles of agile methods</a:t>
             </a:r>
           </a:p>
@@ -3197,14 +4149,14 @@
                 <a:gridCol w="5257800">
                   <a:extLst>
                     <a:ext uri="{9D8B030D-6E8A-4147-A177-3AD203B41FA5}">
-                      <a16:colId xmlns:a16="http://schemas.microsoft.com/office/drawing/2014/main" val="1502541971"/>
+                      <a16:colId xmlns:a16="http://schemas.microsoft.com/office/drawing/2014/main" xmlns="" val="1502541971"/>
                     </a:ext>
                   </a:extLst>
                 </a:gridCol>
                 <a:gridCol w="5257800">
                   <a:extLst>
                     <a:ext uri="{9D8B030D-6E8A-4147-A177-3AD203B41FA5}">
-                      <a16:colId xmlns:a16="http://schemas.microsoft.com/office/drawing/2014/main" val="390624173"/>
+                      <a16:colId xmlns:a16="http://schemas.microsoft.com/office/drawing/2014/main" xmlns="" val="390624173"/>
                     </a:ext>
                   </a:extLst>
                 </a:gridCol>
@@ -3238,7 +4190,7 @@
                 </a:tc>
                 <a:extLst>
                   <a:ext uri="{0D108BD9-81ED-4DB2-BD59-A6C34878D82A}">
-                    <a16:rowId xmlns:a16="http://schemas.microsoft.com/office/drawing/2014/main" val="1895841259"/>
+                    <a16:rowId xmlns:a16="http://schemas.microsoft.com/office/drawing/2014/main" xmlns="" val="1895841259"/>
                   </a:ext>
                 </a:extLst>
               </a:tr>
@@ -3276,7 +4228,7 @@
                 </a:tc>
                 <a:extLst>
                   <a:ext uri="{0D108BD9-81ED-4DB2-BD59-A6C34878D82A}">
-                    <a16:rowId xmlns:a16="http://schemas.microsoft.com/office/drawing/2014/main" val="2586584921"/>
+                    <a16:rowId xmlns:a16="http://schemas.microsoft.com/office/drawing/2014/main" xmlns="" val="2586584921"/>
                   </a:ext>
                 </a:extLst>
               </a:tr>
@@ -3314,7 +4266,7 @@
                 </a:tc>
                 <a:extLst>
                   <a:ext uri="{0D108BD9-81ED-4DB2-BD59-A6C34878D82A}">
-                    <a16:rowId xmlns:a16="http://schemas.microsoft.com/office/drawing/2014/main" val="2688578357"/>
+                    <a16:rowId xmlns:a16="http://schemas.microsoft.com/office/drawing/2014/main" xmlns="" val="2688578357"/>
                   </a:ext>
                 </a:extLst>
               </a:tr>
@@ -3352,7 +4304,7 @@
                 </a:tc>
                 <a:extLst>
                   <a:ext uri="{0D108BD9-81ED-4DB2-BD59-A6C34878D82A}">
-                    <a16:rowId xmlns:a16="http://schemas.microsoft.com/office/drawing/2014/main" val="1900470694"/>
+                    <a16:rowId xmlns:a16="http://schemas.microsoft.com/office/drawing/2014/main" xmlns="" val="1900470694"/>
                   </a:ext>
                 </a:extLst>
               </a:tr>
@@ -3390,7 +4342,7 @@
                 </a:tc>
                 <a:extLst>
                   <a:ext uri="{0D108BD9-81ED-4DB2-BD59-A6C34878D82A}">
-                    <a16:rowId xmlns:a16="http://schemas.microsoft.com/office/drawing/2014/main" val="2577264218"/>
+                    <a16:rowId xmlns:a16="http://schemas.microsoft.com/office/drawing/2014/main" xmlns="" val="2577264218"/>
                   </a:ext>
                 </a:extLst>
               </a:tr>
@@ -3428,7 +4380,7 @@
                 </a:tc>
                 <a:extLst>
                   <a:ext uri="{0D108BD9-81ED-4DB2-BD59-A6C34878D82A}">
-                    <a16:rowId xmlns:a16="http://schemas.microsoft.com/office/drawing/2014/main" val="2187932991"/>
+                    <a16:rowId xmlns:a16="http://schemas.microsoft.com/office/drawing/2014/main" xmlns="" val="2187932991"/>
                   </a:ext>
                 </a:extLst>
               </a:tr>
@@ -3440,6 +4392,694 @@
     <p:extLst>
       <p:ext uri="{BB962C8B-B14F-4D97-AF65-F5344CB8AC3E}">
         <p14:creationId xmlns:p14="http://schemas.microsoft.com/office/powerpoint/2010/main" val="182386113"/>
+      </p:ext>
+    </p:extLst>
+  </p:cSld>
+  <p:clrMapOvr>
+    <a:masterClrMapping/>
+  </p:clrMapOvr>
+  <p:timing>
+    <p:tnLst>
+      <p:par>
+        <p:cTn id="1" dur="indefinite" restart="never" nodeType="tmRoot"/>
+      </p:par>
+    </p:tnLst>
+  </p:timing>
+</p:sld>
+</file>
+
+<file path=ppt/slides/slide4.xml><?xml version="1.0" encoding="utf-8"?>
+<p:sld xmlns:a="http://schemas.openxmlformats.org/drawingml/2006/main" xmlns:r="http://schemas.openxmlformats.org/officeDocument/2006/relationships" xmlns:p="http://schemas.openxmlformats.org/presentationml/2006/main">
+  <p:cSld>
+    <p:spTree>
+      <p:nvGrpSpPr>
+        <p:cNvPr id="1" name=""/>
+        <p:cNvGrpSpPr/>
+        <p:nvPr/>
+      </p:nvGrpSpPr>
+      <p:grpSpPr>
+        <a:xfrm>
+          <a:off x="0" y="0"/>
+          <a:ext cx="0" cy="0"/>
+          <a:chOff x="0" y="0"/>
+          <a:chExt cx="0" cy="0"/>
+        </a:xfrm>
+      </p:grpSpPr>
+      <p:sp>
+        <p:nvSpPr>
+          <p:cNvPr id="2" name="Title 1"/>
+          <p:cNvSpPr>
+            <a:spLocks noGrp="1"/>
+          </p:cNvSpPr>
+          <p:nvPr>
+            <p:ph type="title"/>
+          </p:nvPr>
+        </p:nvSpPr>
+        <p:spPr/>
+        <p:txBody>
+          <a:bodyPr>
+            <a:normAutofit/>
+          </a:bodyPr>
+          <a:lstStyle/>
+          <a:p>
+            <a:pPr algn="ctr"/>
+            <a:r>
+              <a:rPr lang="en-PH" sz="4000" dirty="0" smtClean="0"/>
+              <a:t>Version control</a:t>
+            </a:r>
+            <a:endParaRPr lang="fil-PH" sz="4000" dirty="0"/>
+          </a:p>
+        </p:txBody>
+      </p:sp>
+      <p:sp>
+        <p:nvSpPr>
+          <p:cNvPr id="3" name="Content Placeholder 2"/>
+          <p:cNvSpPr>
+            <a:spLocks noGrp="1"/>
+          </p:cNvSpPr>
+          <p:nvPr>
+            <p:ph idx="1"/>
+          </p:nvPr>
+        </p:nvSpPr>
+        <p:spPr/>
+        <p:txBody>
+          <a:bodyPr>
+            <a:noAutofit/>
+          </a:bodyPr>
+          <a:lstStyle/>
+          <a:p>
+            <a:pPr marL="0" indent="0">
+              <a:buNone/>
+            </a:pPr>
+            <a:r>
+              <a:rPr lang="en-PH" dirty="0" smtClean="0"/>
+              <a:t>This is the management of changes to all files involved in development, including but not limited to: </a:t>
+            </a:r>
+          </a:p>
+          <a:p>
+            <a:pPr lvl="1"/>
+            <a:r>
+              <a:rPr lang="en-PH" sz="2800" dirty="0" smtClean="0"/>
+              <a:t>source codes</a:t>
+            </a:r>
+          </a:p>
+          <a:p>
+            <a:pPr lvl="1"/>
+            <a:r>
+              <a:rPr lang="en-PH" sz="2800" dirty="0" smtClean="0"/>
+              <a:t>scripts</a:t>
+            </a:r>
+          </a:p>
+          <a:p>
+            <a:pPr lvl="1"/>
+            <a:r>
+              <a:rPr lang="en-PH" sz="2800" dirty="0" smtClean="0"/>
+              <a:t>documentations</a:t>
+            </a:r>
+            <a:endParaRPr lang="en-PH" dirty="0" smtClean="0"/>
+          </a:p>
+          <a:p>
+            <a:pPr marL="0" indent="0">
+              <a:buNone/>
+            </a:pPr>
+            <a:endParaRPr lang="en-PH" dirty="0"/>
+          </a:p>
+          <a:p>
+            <a:pPr marL="0" indent="0">
+              <a:buNone/>
+            </a:pPr>
+            <a:r>
+              <a:rPr lang="en-PH" dirty="0" smtClean="0"/>
+              <a:t>Examples of version control systems are:</a:t>
+            </a:r>
+          </a:p>
+          <a:p>
+            <a:pPr lvl="1"/>
+            <a:r>
+              <a:rPr lang="en-PH" sz="2800" dirty="0" smtClean="0"/>
+              <a:t>CVS (Concurrent Versioning Syste</a:t>
+            </a:r>
+            <a:r>
+              <a:rPr lang="en-PH" sz="2800" dirty="0"/>
+              <a:t>m</a:t>
+            </a:r>
+            <a:r>
+              <a:rPr lang="en-PH" sz="2800" dirty="0" smtClean="0"/>
+              <a:t>)</a:t>
+            </a:r>
+          </a:p>
+          <a:p>
+            <a:pPr lvl="1"/>
+            <a:r>
+              <a:rPr lang="en-PH" sz="2800" dirty="0" smtClean="0"/>
+              <a:t>SVN (Subversion)</a:t>
+            </a:r>
+          </a:p>
+          <a:p>
+            <a:pPr lvl="1"/>
+            <a:r>
+              <a:rPr lang="en-PH" sz="2800" dirty="0" err="1" smtClean="0"/>
+              <a:t>Git</a:t>
+            </a:r>
+            <a:endParaRPr lang="fil-PH" sz="2800" dirty="0"/>
+          </a:p>
+        </p:txBody>
+      </p:sp>
+    </p:spTree>
+    <p:extLst>
+      <p:ext uri="{BB962C8B-B14F-4D97-AF65-F5344CB8AC3E}">
+        <p14:creationId xmlns:p14="http://schemas.microsoft.com/office/powerpoint/2010/main" val="737206327"/>
+      </p:ext>
+    </p:extLst>
+  </p:cSld>
+  <p:clrMapOvr>
+    <a:masterClrMapping/>
+  </p:clrMapOvr>
+  <p:timing>
+    <p:tnLst>
+      <p:par>
+        <p:cTn id="1" dur="indefinite" restart="never" nodeType="tmRoot"/>
+      </p:par>
+    </p:tnLst>
+  </p:timing>
+</p:sld>
+</file>
+
+<file path=ppt/slides/slide5.xml><?xml version="1.0" encoding="utf-8"?>
+<p:sld xmlns:a="http://schemas.openxmlformats.org/drawingml/2006/main" xmlns:r="http://schemas.openxmlformats.org/officeDocument/2006/relationships" xmlns:p="http://schemas.openxmlformats.org/presentationml/2006/main">
+  <p:cSld>
+    <p:spTree>
+      <p:nvGrpSpPr>
+        <p:cNvPr id="1" name=""/>
+        <p:cNvGrpSpPr/>
+        <p:nvPr/>
+      </p:nvGrpSpPr>
+      <p:grpSpPr>
+        <a:xfrm>
+          <a:off x="0" y="0"/>
+          <a:ext cx="0" cy="0"/>
+          <a:chOff x="0" y="0"/>
+          <a:chExt cx="0" cy="0"/>
+        </a:xfrm>
+      </p:grpSpPr>
+      <p:sp>
+        <p:nvSpPr>
+          <p:cNvPr id="2" name="Title 1"/>
+          <p:cNvSpPr>
+            <a:spLocks noGrp="1"/>
+          </p:cNvSpPr>
+          <p:nvPr>
+            <p:ph type="title"/>
+          </p:nvPr>
+        </p:nvSpPr>
+        <p:spPr>
+          <a:xfrm>
+            <a:off x="7625083" y="1820562"/>
+            <a:ext cx="4384589" cy="2605762"/>
+          </a:xfrm>
+        </p:spPr>
+        <p:txBody>
+          <a:bodyPr>
+            <a:normAutofit/>
+          </a:bodyPr>
+          <a:lstStyle/>
+          <a:p>
+            <a:pPr algn="ctr"/>
+            <a:r>
+              <a:rPr lang="en-PH" sz="3600" dirty="0" smtClean="0">
+                <a:latin typeface="+mn-lt"/>
+              </a:rPr>
+              <a:t>CVS commands screenshot from a Linux terminal, accessed through </a:t>
+            </a:r>
+            <a:r>
+              <a:rPr lang="en-PH" sz="3600" dirty="0" err="1" smtClean="0">
+                <a:latin typeface="+mn-lt"/>
+              </a:rPr>
+              <a:t>MtPuTTY</a:t>
+            </a:r>
+            <a:r>
+              <a:rPr lang="en-PH" sz="3600" dirty="0" smtClean="0">
+                <a:latin typeface="+mn-lt"/>
+              </a:rPr>
+              <a:t> SSH</a:t>
+            </a:r>
+            <a:endParaRPr lang="fil-PH" sz="3600" dirty="0">
+              <a:latin typeface="+mn-lt"/>
+            </a:endParaRPr>
+          </a:p>
+        </p:txBody>
+      </p:sp>
+      <p:pic>
+        <p:nvPicPr>
+          <p:cNvPr id="4" name="Picture 3"/>
+          <p:cNvPicPr>
+            <a:picLocks noChangeAspect="1"/>
+          </p:cNvPicPr>
+          <p:nvPr/>
+        </p:nvPicPr>
+        <p:blipFill>
+          <a:blip r:embed="rId3">
+            <a:extLst>
+              <a:ext uri="{28A0092B-C50C-407E-A947-70E740481C1C}">
+                <a14:useLocalDpi xmlns:a14="http://schemas.microsoft.com/office/drawing/2010/main" val="0"/>
+              </a:ext>
+            </a:extLst>
+          </a:blip>
+          <a:stretch>
+            <a:fillRect/>
+          </a:stretch>
+        </p:blipFill>
+        <p:spPr>
+          <a:xfrm>
+            <a:off x="164758" y="192076"/>
+            <a:ext cx="7241058" cy="6474446"/>
+          </a:xfrm>
+          <a:prstGeom prst="rect">
+            <a:avLst/>
+          </a:prstGeom>
+        </p:spPr>
+      </p:pic>
+    </p:spTree>
+    <p:extLst>
+      <p:ext uri="{BB962C8B-B14F-4D97-AF65-F5344CB8AC3E}">
+        <p14:creationId xmlns:p14="http://schemas.microsoft.com/office/powerpoint/2010/main" val="1620788223"/>
+      </p:ext>
+    </p:extLst>
+  </p:cSld>
+  <p:clrMapOvr>
+    <a:masterClrMapping/>
+  </p:clrMapOvr>
+  <p:timing>
+    <p:tnLst>
+      <p:par>
+        <p:cTn id="1" dur="indefinite" restart="never" nodeType="tmRoot"/>
+      </p:par>
+    </p:tnLst>
+  </p:timing>
+</p:sld>
+</file>
+
+<file path=ppt/slides/slide6.xml><?xml version="1.0" encoding="utf-8"?>
+<p:sld xmlns:a="http://schemas.openxmlformats.org/drawingml/2006/main" xmlns:r="http://schemas.openxmlformats.org/officeDocument/2006/relationships" xmlns:p="http://schemas.openxmlformats.org/presentationml/2006/main">
+  <p:cSld>
+    <p:spTree>
+      <p:nvGrpSpPr>
+        <p:cNvPr id="1" name=""/>
+        <p:cNvGrpSpPr/>
+        <p:nvPr/>
+      </p:nvGrpSpPr>
+      <p:grpSpPr>
+        <a:xfrm>
+          <a:off x="0" y="0"/>
+          <a:ext cx="0" cy="0"/>
+          <a:chOff x="0" y="0"/>
+          <a:chExt cx="0" cy="0"/>
+        </a:xfrm>
+      </p:grpSpPr>
+      <p:pic>
+        <p:nvPicPr>
+          <p:cNvPr id="4" name="Picture 3"/>
+          <p:cNvPicPr>
+            <a:picLocks noChangeAspect="1"/>
+          </p:cNvPicPr>
+          <p:nvPr/>
+        </p:nvPicPr>
+        <p:blipFill>
+          <a:blip r:embed="rId3">
+            <a:extLst>
+              <a:ext uri="{28A0092B-C50C-407E-A947-70E740481C1C}">
+                <a14:useLocalDpi xmlns:a14="http://schemas.microsoft.com/office/drawing/2010/main" val="0"/>
+              </a:ext>
+            </a:extLst>
+          </a:blip>
+          <a:stretch>
+            <a:fillRect/>
+          </a:stretch>
+        </p:blipFill>
+        <p:spPr>
+          <a:xfrm>
+            <a:off x="137704" y="220163"/>
+            <a:ext cx="8466365" cy="6363517"/>
+          </a:xfrm>
+          <a:prstGeom prst="rect">
+            <a:avLst/>
+          </a:prstGeom>
+        </p:spPr>
+      </p:pic>
+      <p:sp>
+        <p:nvSpPr>
+          <p:cNvPr id="5" name="TextBox 4"/>
+          <p:cNvSpPr txBox="1"/>
+          <p:nvPr/>
+        </p:nvSpPr>
+        <p:spPr>
+          <a:xfrm>
+            <a:off x="8943703" y="1471749"/>
+            <a:ext cx="2873829" cy="4524315"/>
+          </a:xfrm>
+          <a:prstGeom prst="rect">
+            <a:avLst/>
+          </a:prstGeom>
+          <a:noFill/>
+        </p:spPr>
+        <p:txBody>
+          <a:bodyPr wrap="square" rtlCol="0">
+            <a:spAutoFit/>
+          </a:bodyPr>
+          <a:lstStyle/>
+          <a:p>
+            <a:r>
+              <a:rPr lang="en-PH" sz="3200" dirty="0" smtClean="0"/>
+              <a:t>SVN commands screenshot from Windows file explorer, where </a:t>
+            </a:r>
+            <a:r>
+              <a:rPr lang="en-PH" sz="3200" dirty="0" err="1" smtClean="0"/>
+              <a:t>TortoiseSVN</a:t>
+            </a:r>
+            <a:r>
+              <a:rPr lang="en-PH" sz="3200" dirty="0" smtClean="0"/>
+              <a:t> is integrated in the context menu</a:t>
+            </a:r>
+            <a:endParaRPr lang="fil-PH" sz="3200" dirty="0"/>
+          </a:p>
+        </p:txBody>
+      </p:sp>
+    </p:spTree>
+    <p:extLst>
+      <p:ext uri="{BB962C8B-B14F-4D97-AF65-F5344CB8AC3E}">
+        <p14:creationId xmlns:p14="http://schemas.microsoft.com/office/powerpoint/2010/main" val="4040327882"/>
+      </p:ext>
+    </p:extLst>
+  </p:cSld>
+  <p:clrMapOvr>
+    <a:masterClrMapping/>
+  </p:clrMapOvr>
+  <p:timing>
+    <p:tnLst>
+      <p:par>
+        <p:cTn id="1" dur="indefinite" restart="never" nodeType="tmRoot"/>
+      </p:par>
+    </p:tnLst>
+  </p:timing>
+</p:sld>
+</file>
+
+<file path=ppt/slides/slide7.xml><?xml version="1.0" encoding="utf-8"?>
+<p:sld xmlns:a="http://schemas.openxmlformats.org/drawingml/2006/main" xmlns:r="http://schemas.openxmlformats.org/officeDocument/2006/relationships" xmlns:p="http://schemas.openxmlformats.org/presentationml/2006/main">
+  <p:cSld>
+    <p:spTree>
+      <p:nvGrpSpPr>
+        <p:cNvPr id="1" name=""/>
+        <p:cNvGrpSpPr/>
+        <p:nvPr/>
+      </p:nvGrpSpPr>
+      <p:grpSpPr>
+        <a:xfrm>
+          <a:off x="0" y="0"/>
+          <a:ext cx="0" cy="0"/>
+          <a:chOff x="0" y="0"/>
+          <a:chExt cx="0" cy="0"/>
+        </a:xfrm>
+      </p:grpSpPr>
+      <p:pic>
+        <p:nvPicPr>
+          <p:cNvPr id="4" name="Picture 3"/>
+          <p:cNvPicPr>
+            <a:picLocks noChangeAspect="1"/>
+          </p:cNvPicPr>
+          <p:nvPr/>
+        </p:nvPicPr>
+        <p:blipFill>
+          <a:blip r:embed="rId3">
+            <a:extLst>
+              <a:ext uri="{28A0092B-C50C-407E-A947-70E740481C1C}">
+                <a14:useLocalDpi xmlns:a14="http://schemas.microsoft.com/office/drawing/2010/main" val="0"/>
+              </a:ext>
+            </a:extLst>
+          </a:blip>
+          <a:stretch>
+            <a:fillRect/>
+          </a:stretch>
+        </p:blipFill>
+        <p:spPr>
+          <a:xfrm>
+            <a:off x="152836" y="113210"/>
+            <a:ext cx="7270784" cy="6631577"/>
+          </a:xfrm>
+          <a:prstGeom prst="rect">
+            <a:avLst/>
+          </a:prstGeom>
+        </p:spPr>
+      </p:pic>
+      <p:sp>
+        <p:nvSpPr>
+          <p:cNvPr id="5" name="TextBox 4"/>
+          <p:cNvSpPr txBox="1"/>
+          <p:nvPr/>
+        </p:nvSpPr>
+        <p:spPr>
+          <a:xfrm>
+            <a:off x="7820297" y="1924594"/>
+            <a:ext cx="3936274" cy="2554545"/>
+          </a:xfrm>
+          <a:prstGeom prst="rect">
+            <a:avLst/>
+          </a:prstGeom>
+          <a:noFill/>
+        </p:spPr>
+        <p:txBody>
+          <a:bodyPr wrap="square" rtlCol="0">
+            <a:spAutoFit/>
+          </a:bodyPr>
+          <a:lstStyle/>
+          <a:p>
+            <a:r>
+              <a:rPr lang="en-PH" sz="3200" dirty="0" smtClean="0"/>
+              <a:t>SVN logs screenshot, seen after clicking the “Show logs” command from the </a:t>
+            </a:r>
+            <a:r>
+              <a:rPr lang="en-PH" sz="3200" dirty="0" err="1" smtClean="0"/>
+              <a:t>TortoiseSVN</a:t>
+            </a:r>
+            <a:r>
+              <a:rPr lang="en-PH" sz="3200" dirty="0" smtClean="0"/>
+              <a:t> context menu</a:t>
+            </a:r>
+            <a:endParaRPr lang="fil-PH" sz="3200" dirty="0"/>
+          </a:p>
+        </p:txBody>
+      </p:sp>
+    </p:spTree>
+    <p:extLst>
+      <p:ext uri="{BB962C8B-B14F-4D97-AF65-F5344CB8AC3E}">
+        <p14:creationId xmlns:p14="http://schemas.microsoft.com/office/powerpoint/2010/main" val="3447333568"/>
+      </p:ext>
+    </p:extLst>
+  </p:cSld>
+  <p:clrMapOvr>
+    <a:masterClrMapping/>
+  </p:clrMapOvr>
+  <p:timing>
+    <p:tnLst>
+      <p:par>
+        <p:cTn id="1" dur="indefinite" restart="never" nodeType="tmRoot"/>
+      </p:par>
+    </p:tnLst>
+  </p:timing>
+</p:sld>
+</file>
+
+<file path=ppt/slides/slide8.xml><?xml version="1.0" encoding="utf-8"?>
+<p:sld xmlns:a="http://schemas.openxmlformats.org/drawingml/2006/main" xmlns:r="http://schemas.openxmlformats.org/officeDocument/2006/relationships" xmlns:p="http://schemas.openxmlformats.org/presentationml/2006/main">
+  <p:cSld>
+    <p:spTree>
+      <p:nvGrpSpPr>
+        <p:cNvPr id="1" name=""/>
+        <p:cNvGrpSpPr/>
+        <p:nvPr/>
+      </p:nvGrpSpPr>
+      <p:grpSpPr>
+        <a:xfrm>
+          <a:off x="0" y="0"/>
+          <a:ext cx="0" cy="0"/>
+          <a:chOff x="0" y="0"/>
+          <a:chExt cx="0" cy="0"/>
+        </a:xfrm>
+      </p:grpSpPr>
+      <p:pic>
+        <p:nvPicPr>
+          <p:cNvPr id="4" name="Picture 3"/>
+          <p:cNvPicPr>
+            <a:picLocks noChangeAspect="1"/>
+          </p:cNvPicPr>
+          <p:nvPr/>
+        </p:nvPicPr>
+        <p:blipFill>
+          <a:blip r:embed="rId3">
+            <a:extLst>
+              <a:ext uri="{28A0092B-C50C-407E-A947-70E740481C1C}">
+                <a14:useLocalDpi xmlns:a14="http://schemas.microsoft.com/office/drawing/2010/main" val="0"/>
+              </a:ext>
+            </a:extLst>
+          </a:blip>
+          <a:stretch>
+            <a:fillRect/>
+          </a:stretch>
+        </p:blipFill>
+        <p:spPr>
+          <a:xfrm>
+            <a:off x="87085" y="69667"/>
+            <a:ext cx="7436498" cy="6688184"/>
+          </a:xfrm>
+          <a:prstGeom prst="rect">
+            <a:avLst/>
+          </a:prstGeom>
+        </p:spPr>
+      </p:pic>
+      <p:sp>
+        <p:nvSpPr>
+          <p:cNvPr id="5" name="TextBox 4"/>
+          <p:cNvSpPr txBox="1"/>
+          <p:nvPr/>
+        </p:nvSpPr>
+        <p:spPr>
+          <a:xfrm>
+            <a:off x="8055429" y="1628502"/>
+            <a:ext cx="3735977" cy="2554545"/>
+          </a:xfrm>
+          <a:prstGeom prst="rect">
+            <a:avLst/>
+          </a:prstGeom>
+          <a:noFill/>
+        </p:spPr>
+        <p:txBody>
+          <a:bodyPr wrap="square" rtlCol="0">
+            <a:spAutoFit/>
+          </a:bodyPr>
+          <a:lstStyle/>
+          <a:p>
+            <a:r>
+              <a:rPr lang="en-PH" sz="3200" dirty="0" err="1" smtClean="0"/>
+              <a:t>Git</a:t>
+            </a:r>
+            <a:r>
+              <a:rPr lang="en-PH" sz="3200" dirty="0" smtClean="0"/>
+              <a:t> bash screenshot</a:t>
+            </a:r>
+            <a:r>
+              <a:rPr lang="en-PH" sz="3200" dirty="0"/>
+              <a:t>;</a:t>
+            </a:r>
+            <a:r>
+              <a:rPr lang="en-PH" sz="3200" dirty="0" smtClean="0"/>
+              <a:t> current directory is inside the cloned repository’s local working copy</a:t>
+            </a:r>
+            <a:endParaRPr lang="fil-PH" sz="3200" dirty="0"/>
+          </a:p>
+        </p:txBody>
+      </p:sp>
+    </p:spTree>
+    <p:extLst>
+      <p:ext uri="{BB962C8B-B14F-4D97-AF65-F5344CB8AC3E}">
+        <p14:creationId xmlns:p14="http://schemas.microsoft.com/office/powerpoint/2010/main" val="2729123275"/>
+      </p:ext>
+    </p:extLst>
+  </p:cSld>
+  <p:clrMapOvr>
+    <a:masterClrMapping/>
+  </p:clrMapOvr>
+  <p:timing>
+    <p:tnLst>
+      <p:par>
+        <p:cTn id="1" dur="indefinite" restart="never" nodeType="tmRoot"/>
+      </p:par>
+    </p:tnLst>
+  </p:timing>
+</p:sld>
+</file>
+
+<file path=ppt/slides/slide9.xml><?xml version="1.0" encoding="utf-8"?>
+<p:sld xmlns:a="http://schemas.openxmlformats.org/drawingml/2006/main" xmlns:r="http://schemas.openxmlformats.org/officeDocument/2006/relationships" xmlns:p="http://schemas.openxmlformats.org/presentationml/2006/main">
+  <p:cSld>
+    <p:spTree>
+      <p:nvGrpSpPr>
+        <p:cNvPr id="1" name=""/>
+        <p:cNvGrpSpPr/>
+        <p:nvPr/>
+      </p:nvGrpSpPr>
+      <p:grpSpPr>
+        <a:xfrm>
+          <a:off x="0" y="0"/>
+          <a:ext cx="0" cy="0"/>
+          <a:chOff x="0" y="0"/>
+          <a:chExt cx="0" cy="0"/>
+        </a:xfrm>
+      </p:grpSpPr>
+      <p:sp>
+        <p:nvSpPr>
+          <p:cNvPr id="4" name="TextBox 3"/>
+          <p:cNvSpPr txBox="1"/>
+          <p:nvPr/>
+        </p:nvSpPr>
+        <p:spPr>
+          <a:xfrm>
+            <a:off x="452846" y="209006"/>
+            <a:ext cx="11207931" cy="646331"/>
+          </a:xfrm>
+          <a:prstGeom prst="rect">
+            <a:avLst/>
+          </a:prstGeom>
+          <a:noFill/>
+        </p:spPr>
+        <p:txBody>
+          <a:bodyPr wrap="square" rtlCol="0">
+            <a:spAutoFit/>
+          </a:bodyPr>
+          <a:lstStyle/>
+          <a:p>
+            <a:pPr algn="ctr"/>
+            <a:r>
+              <a:rPr lang="en-PH" sz="3600" dirty="0" smtClean="0"/>
+              <a:t>Frequently used version control systems’ commands:</a:t>
+            </a:r>
+            <a:endParaRPr lang="fil-PH" sz="3600" dirty="0"/>
+          </a:p>
+        </p:txBody>
+      </p:sp>
+      <p:sp>
+        <p:nvSpPr>
+          <p:cNvPr id="5" name="TextBox 4"/>
+          <p:cNvSpPr txBox="1"/>
+          <p:nvPr/>
+        </p:nvSpPr>
+        <p:spPr>
+          <a:xfrm>
+            <a:off x="391886" y="1227909"/>
+            <a:ext cx="11408228" cy="400110"/>
+          </a:xfrm>
+          <a:prstGeom prst="rect">
+            <a:avLst/>
+          </a:prstGeom>
+          <a:noFill/>
+        </p:spPr>
+        <p:txBody>
+          <a:bodyPr wrap="square" rtlCol="0">
+            <a:spAutoFit/>
+          </a:bodyPr>
+          <a:lstStyle/>
+          <a:p>
+            <a:r>
+              <a:rPr lang="en-PH" sz="2000" dirty="0" smtClean="0"/>
+              <a:t>When obtaining a working copy of the repository:</a:t>
+            </a:r>
+            <a:endParaRPr lang="fil-PH" sz="2000" dirty="0"/>
+          </a:p>
+        </p:txBody>
+      </p:sp>
+    </p:spTree>
+    <p:extLst>
+      <p:ext uri="{BB962C8B-B14F-4D97-AF65-F5344CB8AC3E}">
+        <p14:creationId xmlns:p14="http://schemas.microsoft.com/office/powerpoint/2010/main" val="2634749874"/>
       </p:ext>
     </p:extLst>
   </p:cSld>
@@ -3742,4 +5382,265 @@
     </a:ext>
   </a:extLst>
 </a:theme>
+</file>
+
+<file path=ppt/theme/theme2.xml><?xml version="1.0" encoding="utf-8"?>
+<a:theme xmlns:a="http://schemas.openxmlformats.org/drawingml/2006/main" name="Office Theme">
+  <a:themeElements>
+    <a:clrScheme name="Office">
+      <a:dk1>
+        <a:sysClr val="windowText" lastClr="000000"/>
+      </a:dk1>
+      <a:lt1>
+        <a:sysClr val="window" lastClr="FFFFFF"/>
+      </a:lt1>
+      <a:dk2>
+        <a:srgbClr val="44546A"/>
+      </a:dk2>
+      <a:lt2>
+        <a:srgbClr val="E7E6E6"/>
+      </a:lt2>
+      <a:accent1>
+        <a:srgbClr val="5B9BD5"/>
+      </a:accent1>
+      <a:accent2>
+        <a:srgbClr val="ED7D31"/>
+      </a:accent2>
+      <a:accent3>
+        <a:srgbClr val="A5A5A5"/>
+      </a:accent3>
+      <a:accent4>
+        <a:srgbClr val="FFC000"/>
+      </a:accent4>
+      <a:accent5>
+        <a:srgbClr val="4472C4"/>
+      </a:accent5>
+      <a:accent6>
+        <a:srgbClr val="70AD47"/>
+      </a:accent6>
+      <a:hlink>
+        <a:srgbClr val="0563C1"/>
+      </a:hlink>
+      <a:folHlink>
+        <a:srgbClr val="954F72"/>
+      </a:folHlink>
+    </a:clrScheme>
+    <a:fontScheme name="Office">
+      <a:majorFont>
+        <a:latin typeface="Calibri Light" panose="020F0302020204030204"/>
+        <a:ea typeface=""/>
+        <a:cs typeface=""/>
+        <a:font script="Jpan" typeface="ＭＳ Ｐゴシック"/>
+        <a:font script="Hang" typeface="맑은 고딕"/>
+        <a:font script="Hans" typeface="宋体"/>
+        <a:font script="Hant" typeface="新細明體"/>
+        <a:font script="Arab" typeface="Times New Roman"/>
+        <a:font script="Hebr" typeface="Times New Roman"/>
+        <a:font script="Thai" typeface="Angsana New"/>
+        <a:font script="Ethi" typeface="Nyala"/>
+        <a:font script="Beng" typeface="Vrinda"/>
+        <a:font script="Gujr" typeface="Shruti"/>
+        <a:font script="Khmr" typeface="MoolBoran"/>
+        <a:font script="Knda" typeface="Tunga"/>
+        <a:font script="Guru" typeface="Raavi"/>
+        <a:font script="Cans" typeface="Euphemia"/>
+        <a:font script="Cher" typeface="Plantagenet Cherokee"/>
+        <a:font script="Yiii" typeface="Microsoft Yi Baiti"/>
+        <a:font script="Tibt" typeface="Microsoft Himalaya"/>
+        <a:font script="Thaa" typeface="MV Boli"/>
+        <a:font script="Deva" typeface="Mangal"/>
+        <a:font script="Telu" typeface="Gautami"/>
+        <a:font script="Taml" typeface="Latha"/>
+        <a:font script="Syrc" typeface="Estrangelo Edessa"/>
+        <a:font script="Orya" typeface="Kalinga"/>
+        <a:font script="Mlym" typeface="Kartika"/>
+        <a:font script="Laoo" typeface="DokChampa"/>
+        <a:font script="Sinh" typeface="Iskoola Pota"/>
+        <a:font script="Mong" typeface="Mongolian Baiti"/>
+        <a:font script="Viet" typeface="Times New Roman"/>
+        <a:font script="Uigh" typeface="Microsoft Uighur"/>
+        <a:font script="Geor" typeface="Sylfaen"/>
+      </a:majorFont>
+      <a:minorFont>
+        <a:latin typeface="Calibri" panose="020F0502020204030204"/>
+        <a:ea typeface=""/>
+        <a:cs typeface=""/>
+        <a:font script="Jpan" typeface="ＭＳ Ｐゴシック"/>
+        <a:font script="Hang" typeface="맑은 고딕"/>
+        <a:font script="Hans" typeface="宋体"/>
+        <a:font script="Hant" typeface="新細明體"/>
+        <a:font script="Arab" typeface="Arial"/>
+        <a:font script="Hebr" typeface="Arial"/>
+        <a:font script="Thai" typeface="Cordia New"/>
+        <a:font script="Ethi" typeface="Nyala"/>
+        <a:font script="Beng" typeface="Vrinda"/>
+        <a:font script="Gujr" typeface="Shruti"/>
+        <a:font script="Khmr" typeface="DaunPenh"/>
+        <a:font script="Knda" typeface="Tunga"/>
+        <a:font script="Guru" typeface="Raavi"/>
+        <a:font script="Cans" typeface="Euphemia"/>
+        <a:font script="Cher" typeface="Plantagenet Cherokee"/>
+        <a:font script="Yiii" typeface="Microsoft Yi Baiti"/>
+        <a:font script="Tibt" typeface="Microsoft Himalaya"/>
+        <a:font script="Thaa" typeface="MV Boli"/>
+        <a:font script="Deva" typeface="Mangal"/>
+        <a:font script="Telu" typeface="Gautami"/>
+        <a:font script="Taml" typeface="Latha"/>
+        <a:font script="Syrc" typeface="Estrangelo Edessa"/>
+        <a:font script="Orya" typeface="Kalinga"/>
+        <a:font script="Mlym" typeface="Kartika"/>
+        <a:font script="Laoo" typeface="DokChampa"/>
+        <a:font script="Sinh" typeface="Iskoola Pota"/>
+        <a:font script="Mong" typeface="Mongolian Baiti"/>
+        <a:font script="Viet" typeface="Arial"/>
+        <a:font script="Uigh" typeface="Microsoft Uighur"/>
+        <a:font script="Geor" typeface="Sylfaen"/>
+      </a:minorFont>
+    </a:fontScheme>
+    <a:fmtScheme name="Office">
+      <a:fillStyleLst>
+        <a:solidFill>
+          <a:schemeClr val="phClr"/>
+        </a:solidFill>
+        <a:gradFill rotWithShape="1">
+          <a:gsLst>
+            <a:gs pos="0">
+              <a:schemeClr val="phClr">
+                <a:lumMod val="110000"/>
+                <a:satMod val="105000"/>
+                <a:tint val="67000"/>
+              </a:schemeClr>
+            </a:gs>
+            <a:gs pos="50000">
+              <a:schemeClr val="phClr">
+                <a:lumMod val="105000"/>
+                <a:satMod val="103000"/>
+                <a:tint val="73000"/>
+              </a:schemeClr>
+            </a:gs>
+            <a:gs pos="100000">
+              <a:schemeClr val="phClr">
+                <a:lumMod val="105000"/>
+                <a:satMod val="109000"/>
+                <a:tint val="81000"/>
+              </a:schemeClr>
+            </a:gs>
+          </a:gsLst>
+          <a:lin ang="5400000" scaled="0"/>
+        </a:gradFill>
+        <a:gradFill rotWithShape="1">
+          <a:gsLst>
+            <a:gs pos="0">
+              <a:schemeClr val="phClr">
+                <a:satMod val="103000"/>
+                <a:lumMod val="102000"/>
+                <a:tint val="94000"/>
+              </a:schemeClr>
+            </a:gs>
+            <a:gs pos="50000">
+              <a:schemeClr val="phClr">
+                <a:satMod val="110000"/>
+                <a:lumMod val="100000"/>
+                <a:shade val="100000"/>
+              </a:schemeClr>
+            </a:gs>
+            <a:gs pos="100000">
+              <a:schemeClr val="phClr">
+                <a:lumMod val="99000"/>
+                <a:satMod val="120000"/>
+                <a:shade val="78000"/>
+              </a:schemeClr>
+            </a:gs>
+          </a:gsLst>
+          <a:lin ang="5400000" scaled="0"/>
+        </a:gradFill>
+      </a:fillStyleLst>
+      <a:lnStyleLst>
+        <a:ln w="6350" cap="flat" cmpd="sng" algn="ctr">
+          <a:solidFill>
+            <a:schemeClr val="phClr"/>
+          </a:solidFill>
+          <a:prstDash val="solid"/>
+          <a:miter lim="800000"/>
+        </a:ln>
+        <a:ln w="12700" cap="flat" cmpd="sng" algn="ctr">
+          <a:solidFill>
+            <a:schemeClr val="phClr"/>
+          </a:solidFill>
+          <a:prstDash val="solid"/>
+          <a:miter lim="800000"/>
+        </a:ln>
+        <a:ln w="19050" cap="flat" cmpd="sng" algn="ctr">
+          <a:solidFill>
+            <a:schemeClr val="phClr"/>
+          </a:solidFill>
+          <a:prstDash val="solid"/>
+          <a:miter lim="800000"/>
+        </a:ln>
+      </a:lnStyleLst>
+      <a:effectStyleLst>
+        <a:effectStyle>
+          <a:effectLst/>
+        </a:effectStyle>
+        <a:effectStyle>
+          <a:effectLst/>
+        </a:effectStyle>
+        <a:effectStyle>
+          <a:effectLst>
+            <a:outerShdw blurRad="57150" dist="19050" dir="5400000" algn="ctr" rotWithShape="0">
+              <a:srgbClr val="000000">
+                <a:alpha val="63000"/>
+              </a:srgbClr>
+            </a:outerShdw>
+          </a:effectLst>
+        </a:effectStyle>
+      </a:effectStyleLst>
+      <a:bgFillStyleLst>
+        <a:solidFill>
+          <a:schemeClr val="phClr"/>
+        </a:solidFill>
+        <a:solidFill>
+          <a:schemeClr val="phClr">
+            <a:tint val="95000"/>
+            <a:satMod val="170000"/>
+          </a:schemeClr>
+        </a:solidFill>
+        <a:gradFill rotWithShape="1">
+          <a:gsLst>
+            <a:gs pos="0">
+              <a:schemeClr val="phClr">
+                <a:tint val="93000"/>
+                <a:satMod val="150000"/>
+                <a:shade val="98000"/>
+                <a:lumMod val="102000"/>
+              </a:schemeClr>
+            </a:gs>
+            <a:gs pos="50000">
+              <a:schemeClr val="phClr">
+                <a:tint val="98000"/>
+                <a:satMod val="130000"/>
+                <a:shade val="90000"/>
+                <a:lumMod val="103000"/>
+              </a:schemeClr>
+            </a:gs>
+            <a:gs pos="100000">
+              <a:schemeClr val="phClr">
+                <a:shade val="63000"/>
+                <a:satMod val="120000"/>
+              </a:schemeClr>
+            </a:gs>
+          </a:gsLst>
+          <a:lin ang="5400000" scaled="0"/>
+        </a:gradFill>
+      </a:bgFillStyleLst>
+    </a:fmtScheme>
+  </a:themeElements>
+  <a:objectDefaults/>
+  <a:extraClrSchemeLst/>
+  <a:extLst>
+    <a:ext uri="{05A4C25C-085E-4340-85A3-A5531E510DB2}">
+      <thm15:themeFamily xmlns:thm15="http://schemas.microsoft.com/office/thememl/2012/main" name="Office Theme" id="{62F939B6-93AF-4DB8-9C6B-D6C7DFDC589F}" vid="{4A3C46E8-61CC-4603-A589-7422A47A8E4A}"/>
+    </a:ext>
+  </a:extLst>
+</a:theme>
 </file>
</xml_diff>

<commit_message>
Finished slides for version control systems
</commit_message>
<xml_diff>
--- a/Agile Development.pptx
+++ b/Agile Development.pptx
@@ -5,7 +5,7 @@
     <p:sldMasterId id="2147483648" r:id="rId1"/>
   </p:sldMasterIdLst>
   <p:notesMasterIdLst>
-    <p:notesMasterId r:id="rId11"/>
+    <p:notesMasterId r:id="rId12"/>
   </p:notesMasterIdLst>
   <p:sldIdLst>
     <p:sldId id="256" r:id="rId2"/>
@@ -17,6 +17,7 @@
     <p:sldId id="262" r:id="rId8"/>
     <p:sldId id="263" r:id="rId9"/>
     <p:sldId id="264" r:id="rId10"/>
+    <p:sldId id="265" r:id="rId11"/>
   </p:sldIdLst>
   <p:sldSz cx="12192000" cy="6858000"/>
   <p:notesSz cx="6858000" cy="9144000"/>
@@ -928,6 +929,98 @@
     <p:extLst>
       <p:ext uri="{BB962C8B-B14F-4D97-AF65-F5344CB8AC3E}">
         <p14:creationId xmlns:p14="http://schemas.microsoft.com/office/powerpoint/2010/main" val="2341228345"/>
+      </p:ext>
+    </p:extLst>
+  </p:cSld>
+  <p:clrMapOvr>
+    <a:masterClrMapping/>
+  </p:clrMapOvr>
+</p:notes>
+</file>
+
+<file path=ppt/notesSlides/notesSlide6.xml><?xml version="1.0" encoding="utf-8"?>
+<p:notes xmlns:a="http://schemas.openxmlformats.org/drawingml/2006/main" xmlns:r="http://schemas.openxmlformats.org/officeDocument/2006/relationships" xmlns:p="http://schemas.openxmlformats.org/presentationml/2006/main">
+  <p:cSld>
+    <p:spTree>
+      <p:nvGrpSpPr>
+        <p:cNvPr id="1" name=""/>
+        <p:cNvGrpSpPr/>
+        <p:nvPr/>
+      </p:nvGrpSpPr>
+      <p:grpSpPr>
+        <a:xfrm>
+          <a:off x="0" y="0"/>
+          <a:ext cx="0" cy="0"/>
+          <a:chOff x="0" y="0"/>
+          <a:chExt cx="0" cy="0"/>
+        </a:xfrm>
+      </p:grpSpPr>
+      <p:sp>
+        <p:nvSpPr>
+          <p:cNvPr id="2" name="Slide Image Placeholder 1"/>
+          <p:cNvSpPr>
+            <a:spLocks noGrp="1" noRot="1" noChangeAspect="1"/>
+          </p:cNvSpPr>
+          <p:nvPr>
+            <p:ph type="sldImg"/>
+          </p:nvPr>
+        </p:nvSpPr>
+        <p:spPr/>
+      </p:sp>
+      <p:sp>
+        <p:nvSpPr>
+          <p:cNvPr id="3" name="Notes Placeholder 2"/>
+          <p:cNvSpPr>
+            <a:spLocks noGrp="1"/>
+          </p:cNvSpPr>
+          <p:nvPr>
+            <p:ph type="body" idx="1"/>
+          </p:nvPr>
+        </p:nvSpPr>
+        <p:spPr/>
+        <p:txBody>
+          <a:bodyPr/>
+          <a:lstStyle/>
+          <a:p>
+            <a:r>
+              <a:rPr lang="en-PH" dirty="0" smtClean="0"/>
+              <a:t>Next slide is</a:t>
+            </a:r>
+            <a:r>
+              <a:rPr lang="en-PH" baseline="0" dirty="0" smtClean="0"/>
+              <a:t> continuation of commands.</a:t>
+            </a:r>
+            <a:endParaRPr lang="fil-PH" dirty="0"/>
+          </a:p>
+        </p:txBody>
+      </p:sp>
+      <p:sp>
+        <p:nvSpPr>
+          <p:cNvPr id="4" name="Slide Number Placeholder 3"/>
+          <p:cNvSpPr>
+            <a:spLocks noGrp="1"/>
+          </p:cNvSpPr>
+          <p:nvPr>
+            <p:ph type="sldNum" sz="quarter" idx="10"/>
+          </p:nvPr>
+        </p:nvSpPr>
+        <p:spPr/>
+        <p:txBody>
+          <a:bodyPr/>
+          <a:lstStyle/>
+          <a:p>
+            <a:fld id="{E35082E1-2ECF-41F4-9F70-63946E0F9778}" type="slidenum">
+              <a:rPr lang="fil-PH" smtClean="0"/>
+              <a:t>9</a:t>
+            </a:fld>
+            <a:endParaRPr lang="fil-PH"/>
+          </a:p>
+        </p:txBody>
+      </p:sp>
+    </p:spTree>
+    <p:extLst>
+      <p:ext uri="{BB962C8B-B14F-4D97-AF65-F5344CB8AC3E}">
+        <p14:creationId xmlns:p14="http://schemas.microsoft.com/office/powerpoint/2010/main" val="1943949695"/>
       </p:ext>
     </p:extLst>
   </p:cSld>
@@ -3924,6 +4017,206 @@
 </p:sld>
 </file>
 
+<file path=ppt/slides/slide10.xml><?xml version="1.0" encoding="utf-8"?>
+<p:sld xmlns:a="http://schemas.openxmlformats.org/drawingml/2006/main" xmlns:r="http://schemas.openxmlformats.org/officeDocument/2006/relationships" xmlns:p="http://schemas.openxmlformats.org/presentationml/2006/main">
+  <p:cSld>
+    <p:spTree>
+      <p:nvGrpSpPr>
+        <p:cNvPr id="1" name=""/>
+        <p:cNvGrpSpPr/>
+        <p:nvPr/>
+      </p:nvGrpSpPr>
+      <p:grpSpPr>
+        <a:xfrm>
+          <a:off x="0" y="0"/>
+          <a:ext cx="0" cy="0"/>
+          <a:chOff x="0" y="0"/>
+          <a:chExt cx="0" cy="0"/>
+        </a:xfrm>
+      </p:grpSpPr>
+      <p:sp>
+        <p:nvSpPr>
+          <p:cNvPr id="4" name="TextBox 3"/>
+          <p:cNvSpPr txBox="1"/>
+          <p:nvPr/>
+        </p:nvSpPr>
+        <p:spPr>
+          <a:xfrm>
+            <a:off x="409302" y="984068"/>
+            <a:ext cx="11408228" cy="5324535"/>
+          </a:xfrm>
+          <a:prstGeom prst="rect">
+            <a:avLst/>
+          </a:prstGeom>
+          <a:noFill/>
+        </p:spPr>
+        <p:txBody>
+          <a:bodyPr wrap="square" rtlCol="0">
+            <a:spAutoFit/>
+          </a:bodyPr>
+          <a:lstStyle/>
+          <a:p>
+            <a:r>
+              <a:rPr lang="en-PH" sz="2000" dirty="0" smtClean="0"/>
+              <a:t>When</a:t>
+            </a:r>
+            <a:r>
+              <a:rPr lang="en-PH" sz="2000" dirty="0" smtClean="0"/>
+              <a:t> merging changes from one branch to another, it is better to use a diff software to merge the differences easily, rather than using the CLI. This also goes for reverting to an older revision.</a:t>
+            </a:r>
+          </a:p>
+          <a:p>
+            <a:endParaRPr lang="en-PH" sz="2000" dirty="0"/>
+          </a:p>
+          <a:p>
+            <a:endParaRPr lang="en-PH" sz="2000" dirty="0" smtClean="0"/>
+          </a:p>
+          <a:p>
+            <a:endParaRPr lang="en-PH" sz="2000" dirty="0" smtClean="0"/>
+          </a:p>
+          <a:p>
+            <a:endParaRPr lang="en-PH" sz="2000" dirty="0" smtClean="0"/>
+          </a:p>
+          <a:p>
+            <a:endParaRPr lang="en-PH" sz="2000" dirty="0"/>
+          </a:p>
+          <a:p>
+            <a:endParaRPr lang="en-PH" sz="2000" dirty="0" smtClean="0"/>
+          </a:p>
+          <a:p>
+            <a:endParaRPr lang="en-PH" sz="2000" dirty="0"/>
+          </a:p>
+          <a:p>
+            <a:endParaRPr lang="en-PH" sz="2000" dirty="0" smtClean="0"/>
+          </a:p>
+          <a:p>
+            <a:endParaRPr lang="en-PH" sz="2000" dirty="0"/>
+          </a:p>
+          <a:p>
+            <a:endParaRPr lang="en-PH" sz="2000" dirty="0"/>
+          </a:p>
+          <a:p>
+            <a:r>
+              <a:rPr lang="en-PH" sz="2000" dirty="0" smtClean="0"/>
+              <a:t>To</a:t>
+            </a:r>
+            <a:r>
+              <a:rPr lang="en-PH" sz="2000" dirty="0" smtClean="0"/>
+              <a:t> update your working copy:</a:t>
+            </a:r>
+          </a:p>
+          <a:p>
+            <a:pPr marL="800100" lvl="1" indent="-342900">
+              <a:buFont typeface="Arial" panose="020B0604020202020204" pitchFamily="34" charset="0"/>
+              <a:buChar char="•"/>
+            </a:pPr>
+            <a:r>
+              <a:rPr lang="en-PH" sz="2000" dirty="0" smtClean="0"/>
+              <a:t>CVS and SVN -&gt; update &lt;branch&gt;</a:t>
+            </a:r>
+          </a:p>
+          <a:p>
+            <a:pPr marL="1257300" lvl="2" indent="-342900">
+              <a:buFont typeface="Arial" panose="020B0604020202020204" pitchFamily="34" charset="0"/>
+              <a:buChar char="•"/>
+            </a:pPr>
+            <a:r>
+              <a:rPr lang="en-PH" sz="2000" dirty="0" smtClean="0"/>
+              <a:t>Example -&gt; </a:t>
+            </a:r>
+            <a:r>
+              <a:rPr lang="en-PH" sz="2000" dirty="0" err="1" smtClean="0"/>
+              <a:t>svn</a:t>
+            </a:r>
+            <a:r>
+              <a:rPr lang="en-PH" sz="2000" dirty="0" smtClean="0"/>
+              <a:t> update REL_7-0</a:t>
+            </a:r>
+          </a:p>
+          <a:p>
+            <a:pPr marL="800100" lvl="1" indent="-342900">
+              <a:buFont typeface="Arial" panose="020B0604020202020204" pitchFamily="34" charset="0"/>
+              <a:buChar char="•"/>
+            </a:pPr>
+            <a:r>
+              <a:rPr lang="en-PH" sz="2000" dirty="0" err="1" smtClean="0"/>
+              <a:t>Git</a:t>
+            </a:r>
+            <a:r>
+              <a:rPr lang="en-PH" sz="2000" dirty="0" smtClean="0"/>
+              <a:t> -&gt; pull</a:t>
+            </a:r>
+          </a:p>
+          <a:p>
+            <a:pPr marL="1257300" lvl="2" indent="-342900">
+              <a:buFont typeface="Arial" panose="020B0604020202020204" pitchFamily="34" charset="0"/>
+              <a:buChar char="•"/>
+            </a:pPr>
+            <a:r>
+              <a:rPr lang="en-PH" sz="2000" dirty="0" smtClean="0"/>
+              <a:t>Example -&gt; </a:t>
+            </a:r>
+            <a:r>
+              <a:rPr lang="en-PH" sz="2000" dirty="0" err="1" smtClean="0"/>
+              <a:t>git</a:t>
+            </a:r>
+            <a:r>
+              <a:rPr lang="en-PH" sz="2000" dirty="0" smtClean="0"/>
+              <a:t> pull</a:t>
+            </a:r>
+          </a:p>
+        </p:txBody>
+      </p:sp>
+      <p:pic>
+        <p:nvPicPr>
+          <p:cNvPr id="5" name="Picture 4"/>
+          <p:cNvPicPr>
+            <a:picLocks noChangeAspect="1"/>
+          </p:cNvPicPr>
+          <p:nvPr/>
+        </p:nvPicPr>
+        <p:blipFill>
+          <a:blip r:embed="rId2">
+            <a:extLst>
+              <a:ext uri="{28A0092B-C50C-407E-A947-70E740481C1C}">
+                <a14:useLocalDpi xmlns:a14="http://schemas.microsoft.com/office/drawing/2010/main" val="0"/>
+              </a:ext>
+            </a:extLst>
+          </a:blip>
+          <a:stretch>
+            <a:fillRect/>
+          </a:stretch>
+        </p:blipFill>
+        <p:spPr>
+          <a:xfrm>
+            <a:off x="2334577" y="1830433"/>
+            <a:ext cx="6791325" cy="2552700"/>
+          </a:xfrm>
+          <a:prstGeom prst="rect">
+            <a:avLst/>
+          </a:prstGeom>
+        </p:spPr>
+      </p:pic>
+    </p:spTree>
+    <p:extLst>
+      <p:ext uri="{BB962C8B-B14F-4D97-AF65-F5344CB8AC3E}">
+        <p14:creationId xmlns:p14="http://schemas.microsoft.com/office/powerpoint/2010/main" val="1359682286"/>
+      </p:ext>
+    </p:extLst>
+  </p:cSld>
+  <p:clrMapOvr>
+    <a:masterClrMapping/>
+  </p:clrMapOvr>
+  <p:timing>
+    <p:tnLst>
+      <p:par>
+        <p:cTn id="1" dur="indefinite" restart="never" nodeType="tmRoot"/>
+      </p:par>
+    </p:tnLst>
+  </p:timing>
+</p:sld>
+</file>
+
 <file path=ppt/slides/slide2.xml><?xml version="1.0" encoding="utf-8"?>
 <p:sld xmlns:a="http://schemas.openxmlformats.org/drawingml/2006/main" xmlns:r="http://schemas.openxmlformats.org/officeDocument/2006/relationships" xmlns:p="http://schemas.openxmlformats.org/presentationml/2006/main">
   <p:cSld>
@@ -4149,14 +4442,14 @@
                 <a:gridCol w="5257800">
                   <a:extLst>
                     <a:ext uri="{9D8B030D-6E8A-4147-A177-3AD203B41FA5}">
-                      <a16:colId xmlns:a16="http://schemas.microsoft.com/office/drawing/2014/main" xmlns="" val="1502541971"/>
+                      <a16:colId xmlns="" xmlns:a16="http://schemas.microsoft.com/office/drawing/2014/main" val="1502541971"/>
                     </a:ext>
                   </a:extLst>
                 </a:gridCol>
                 <a:gridCol w="5257800">
                   <a:extLst>
                     <a:ext uri="{9D8B030D-6E8A-4147-A177-3AD203B41FA5}">
-                      <a16:colId xmlns:a16="http://schemas.microsoft.com/office/drawing/2014/main" xmlns="" val="390624173"/>
+                      <a16:colId xmlns="" xmlns:a16="http://schemas.microsoft.com/office/drawing/2014/main" val="390624173"/>
                     </a:ext>
                   </a:extLst>
                 </a:gridCol>
@@ -4190,7 +4483,7 @@
                 </a:tc>
                 <a:extLst>
                   <a:ext uri="{0D108BD9-81ED-4DB2-BD59-A6C34878D82A}">
-                    <a16:rowId xmlns:a16="http://schemas.microsoft.com/office/drawing/2014/main" xmlns="" val="1895841259"/>
+                    <a16:rowId xmlns="" xmlns:a16="http://schemas.microsoft.com/office/drawing/2014/main" val="1895841259"/>
                   </a:ext>
                 </a:extLst>
               </a:tr>
@@ -4228,7 +4521,7 @@
                 </a:tc>
                 <a:extLst>
                   <a:ext uri="{0D108BD9-81ED-4DB2-BD59-A6C34878D82A}">
-                    <a16:rowId xmlns:a16="http://schemas.microsoft.com/office/drawing/2014/main" xmlns="" val="2586584921"/>
+                    <a16:rowId xmlns="" xmlns:a16="http://schemas.microsoft.com/office/drawing/2014/main" val="2586584921"/>
                   </a:ext>
                 </a:extLst>
               </a:tr>
@@ -4266,7 +4559,7 @@
                 </a:tc>
                 <a:extLst>
                   <a:ext uri="{0D108BD9-81ED-4DB2-BD59-A6C34878D82A}">
-                    <a16:rowId xmlns:a16="http://schemas.microsoft.com/office/drawing/2014/main" xmlns="" val="2688578357"/>
+                    <a16:rowId xmlns="" xmlns:a16="http://schemas.microsoft.com/office/drawing/2014/main" val="2688578357"/>
                   </a:ext>
                 </a:extLst>
               </a:tr>
@@ -4304,7 +4597,7 @@
                 </a:tc>
                 <a:extLst>
                   <a:ext uri="{0D108BD9-81ED-4DB2-BD59-A6C34878D82A}">
-                    <a16:rowId xmlns:a16="http://schemas.microsoft.com/office/drawing/2014/main" xmlns="" val="1900470694"/>
+                    <a16:rowId xmlns="" xmlns:a16="http://schemas.microsoft.com/office/drawing/2014/main" val="1900470694"/>
                   </a:ext>
                 </a:extLst>
               </a:tr>
@@ -4342,7 +4635,7 @@
                 </a:tc>
                 <a:extLst>
                   <a:ext uri="{0D108BD9-81ED-4DB2-BD59-A6C34878D82A}">
-                    <a16:rowId xmlns:a16="http://schemas.microsoft.com/office/drawing/2014/main" xmlns="" val="2577264218"/>
+                    <a16:rowId xmlns="" xmlns:a16="http://schemas.microsoft.com/office/drawing/2014/main" val="2577264218"/>
                   </a:ext>
                 </a:extLst>
               </a:tr>
@@ -4380,7 +4673,7 @@
                 </a:tc>
                 <a:extLst>
                   <a:ext uri="{0D108BD9-81ED-4DB2-BD59-A6C34878D82A}">
-                    <a16:rowId xmlns:a16="http://schemas.microsoft.com/office/drawing/2014/main" xmlns="" val="2187932991"/>
+                    <a16:rowId xmlns="" xmlns:a16="http://schemas.microsoft.com/office/drawing/2014/main" val="2187932991"/>
                   </a:ext>
                 </a:extLst>
               </a:tr>
@@ -4540,6 +4833,26 @@
             <a:r>
               <a:rPr lang="en-PH" sz="2800" dirty="0" err="1" smtClean="0"/>
               <a:t>Git</a:t>
+            </a:r>
+            <a:r>
+              <a:rPr lang="en-PH" sz="2800" dirty="0" smtClean="0"/>
+              <a:t> (Either </a:t>
+            </a:r>
+            <a:r>
+              <a:rPr lang="en-PH" sz="2800" dirty="0" err="1" smtClean="0"/>
+              <a:t>Github</a:t>
+            </a:r>
+            <a:r>
+              <a:rPr lang="en-PH" sz="2800" dirty="0" smtClean="0"/>
+              <a:t> or </a:t>
+            </a:r>
+            <a:r>
+              <a:rPr lang="en-PH" sz="2800" dirty="0" err="1" smtClean="0"/>
+              <a:t>Gitlab</a:t>
+            </a:r>
+            <a:r>
+              <a:rPr lang="en-PH" sz="2800" dirty="0" smtClean="0"/>
+              <a:t>)</a:t>
             </a:r>
             <a:endParaRPr lang="fil-PH" sz="2800" dirty="0"/>
           </a:p>
@@ -5023,8 +5336,8 @@
         </p:nvSpPr>
         <p:spPr>
           <a:xfrm>
-            <a:off x="452846" y="209006"/>
-            <a:ext cx="11207931" cy="646331"/>
+            <a:off x="492034" y="150691"/>
+            <a:ext cx="11207931" cy="1077218"/>
           </a:xfrm>
           <a:prstGeom prst="rect">
             <a:avLst/>
@@ -5039,10 +5352,14 @@
           <a:p>
             <a:pPr algn="ctr"/>
             <a:r>
-              <a:rPr lang="en-PH" sz="3600" dirty="0" smtClean="0"/>
-              <a:t>Frequently used version control systems’ commands:</a:t>
-            </a:r>
-            <a:endParaRPr lang="fil-PH" sz="3600" dirty="0"/>
+              <a:rPr lang="en-PH" sz="3200" dirty="0" smtClean="0"/>
+              <a:t>Frequently used version control systems’ </a:t>
+            </a:r>
+            <a:r>
+              <a:rPr lang="en-PH" sz="3200" dirty="0" smtClean="0"/>
+              <a:t>commands (using the CLI):</a:t>
+            </a:r>
+            <a:endParaRPr lang="fil-PH" sz="3200" dirty="0"/>
           </a:p>
         </p:txBody>
       </p:sp>
@@ -5054,8 +5371,8 @@
         </p:nvSpPr>
         <p:spPr>
           <a:xfrm>
-            <a:off x="391886" y="1227909"/>
-            <a:ext cx="11408228" cy="400110"/>
+            <a:off x="391885" y="1593668"/>
+            <a:ext cx="11408228" cy="4708981"/>
           </a:xfrm>
           <a:prstGeom prst="rect">
             <a:avLst/>
@@ -5070,9 +5387,208 @@
           <a:p>
             <a:r>
               <a:rPr lang="en-PH" sz="2000" dirty="0" smtClean="0"/>
-              <a:t>When obtaining a working copy of the repository:</a:t>
-            </a:r>
-            <a:endParaRPr lang="fil-PH" sz="2000" dirty="0"/>
+              <a:t>To</a:t>
+            </a:r>
+            <a:r>
+              <a:rPr lang="en-PH" sz="2000" dirty="0" smtClean="0"/>
+              <a:t> obtain </a:t>
+            </a:r>
+            <a:r>
+              <a:rPr lang="en-PH" sz="2000" dirty="0" smtClean="0"/>
+              <a:t>a working copy of the repository</a:t>
+            </a:r>
+            <a:r>
+              <a:rPr lang="en-PH" sz="2000" dirty="0" smtClean="0"/>
+              <a:t>:</a:t>
+            </a:r>
+          </a:p>
+          <a:p>
+            <a:pPr marL="800100" lvl="1" indent="-342900">
+              <a:buFont typeface="Arial" panose="020B0604020202020204" pitchFamily="34" charset="0"/>
+              <a:buChar char="•"/>
+            </a:pPr>
+            <a:r>
+              <a:rPr lang="en-PH" sz="2000" dirty="0" smtClean="0"/>
+              <a:t>CVS and SVN -&gt; checkout &lt;URL of repository&gt;</a:t>
+            </a:r>
+          </a:p>
+          <a:p>
+            <a:pPr marL="1257300" lvl="2" indent="-342900">
+              <a:buFont typeface="Arial" panose="020B0604020202020204" pitchFamily="34" charset="0"/>
+              <a:buChar char="•"/>
+            </a:pPr>
+            <a:r>
+              <a:rPr lang="en-PH" sz="2000" dirty="0" smtClean="0"/>
+              <a:t>Example -&gt; </a:t>
+            </a:r>
+            <a:r>
+              <a:rPr lang="en-PH" sz="2000" dirty="0" err="1" smtClean="0"/>
+              <a:t>svn</a:t>
+            </a:r>
+            <a:r>
+              <a:rPr lang="en-PH" sz="2000" dirty="0"/>
+              <a:t> checkout http://svn/repos/altus/branches/REL_6-5</a:t>
+            </a:r>
+            <a:endParaRPr lang="en-PH" sz="2000" dirty="0" smtClean="0"/>
+          </a:p>
+          <a:p>
+            <a:pPr marL="800100" lvl="1" indent="-342900">
+              <a:buFont typeface="Arial" panose="020B0604020202020204" pitchFamily="34" charset="0"/>
+              <a:buChar char="•"/>
+            </a:pPr>
+            <a:r>
+              <a:rPr lang="en-PH" sz="2000" dirty="0" err="1" smtClean="0"/>
+              <a:t>Git</a:t>
+            </a:r>
+            <a:r>
+              <a:rPr lang="en-PH" sz="2000" dirty="0" smtClean="0"/>
+              <a:t> -&gt; clone &lt;URL of repository&gt;</a:t>
+            </a:r>
+          </a:p>
+          <a:p>
+            <a:pPr marL="1257300" lvl="2" indent="-342900">
+              <a:buFont typeface="Arial" panose="020B0604020202020204" pitchFamily="34" charset="0"/>
+              <a:buChar char="•"/>
+            </a:pPr>
+            <a:r>
+              <a:rPr lang="en-PH" sz="2000" dirty="0" smtClean="0"/>
+              <a:t>Example -&gt; </a:t>
+            </a:r>
+            <a:r>
+              <a:rPr lang="en-PH" sz="2000" dirty="0" err="1" smtClean="0"/>
+              <a:t>git</a:t>
+            </a:r>
+            <a:r>
+              <a:rPr lang="en-PH" sz="2000" dirty="0"/>
+              <a:t> clone https://</a:t>
+            </a:r>
+            <a:r>
+              <a:rPr lang="en-PH" sz="2000" dirty="0" smtClean="0"/>
+              <a:t>github.com/joeypencil/Joeyjava.git</a:t>
+            </a:r>
+          </a:p>
+          <a:p>
+            <a:pPr marL="1257300" lvl="2" indent="-342900">
+              <a:buFont typeface="Arial" panose="020B0604020202020204" pitchFamily="34" charset="0"/>
+              <a:buChar char="•"/>
+            </a:pPr>
+            <a:endParaRPr lang="en-PH" sz="2000" dirty="0"/>
+          </a:p>
+          <a:p>
+            <a:r>
+              <a:rPr lang="en-PH" sz="2000" dirty="0" smtClean="0"/>
+              <a:t>To check logs of revisions:</a:t>
+            </a:r>
+          </a:p>
+          <a:p>
+            <a:pPr marL="800100" lvl="1" indent="-342900">
+              <a:buFont typeface="Arial" panose="020B0604020202020204" pitchFamily="34" charset="0"/>
+              <a:buChar char="•"/>
+            </a:pPr>
+            <a:r>
+              <a:rPr lang="en-PH" sz="2000" dirty="0" smtClean="0"/>
+              <a:t>CVS and SVN -&gt; log &lt;branch&gt; [--limit &lt;number of revisions&gt;]</a:t>
+            </a:r>
+          </a:p>
+          <a:p>
+            <a:pPr marL="1257300" lvl="2" indent="-342900">
+              <a:buFont typeface="Arial" panose="020B0604020202020204" pitchFamily="34" charset="0"/>
+              <a:buChar char="•"/>
+            </a:pPr>
+            <a:r>
+              <a:rPr lang="en-PH" sz="2000" dirty="0" smtClean="0"/>
+              <a:t>Example -&gt; </a:t>
+            </a:r>
+            <a:r>
+              <a:rPr lang="en-PH" sz="2000" dirty="0" err="1" smtClean="0"/>
+              <a:t>svn</a:t>
+            </a:r>
+            <a:r>
+              <a:rPr lang="en-PH" sz="2000" dirty="0" smtClean="0"/>
+              <a:t> log REL_6-5 --limit 3</a:t>
+            </a:r>
+            <a:endParaRPr lang="en-PH" sz="2000" dirty="0"/>
+          </a:p>
+          <a:p>
+            <a:pPr marL="800100" lvl="1" indent="-342900">
+              <a:buFont typeface="Arial" panose="020B0604020202020204" pitchFamily="34" charset="0"/>
+              <a:buChar char="•"/>
+            </a:pPr>
+            <a:r>
+              <a:rPr lang="en-PH" sz="2000" dirty="0" err="1" smtClean="0"/>
+              <a:t>Git</a:t>
+            </a:r>
+            <a:r>
+              <a:rPr lang="en-PH" sz="2000" dirty="0" smtClean="0"/>
+              <a:t> -&gt; log [-&lt;number of revisions&gt;]</a:t>
+            </a:r>
+          </a:p>
+          <a:p>
+            <a:pPr marL="1257300" lvl="2" indent="-342900">
+              <a:buFont typeface="Arial" panose="020B0604020202020204" pitchFamily="34" charset="0"/>
+              <a:buChar char="•"/>
+            </a:pPr>
+            <a:r>
+              <a:rPr lang="en-PH" sz="2000" dirty="0" smtClean="0"/>
+              <a:t>Example -&gt; </a:t>
+            </a:r>
+            <a:r>
+              <a:rPr lang="en-PH" sz="2000" dirty="0" err="1" smtClean="0"/>
+              <a:t>git</a:t>
+            </a:r>
+            <a:r>
+              <a:rPr lang="en-PH" sz="2000" dirty="0" smtClean="0"/>
+              <a:t> log -5</a:t>
+            </a:r>
+          </a:p>
+          <a:p>
+            <a:pPr marL="1257300" lvl="2" indent="-342900">
+              <a:buFont typeface="Arial" panose="020B0604020202020204" pitchFamily="34" charset="0"/>
+              <a:buChar char="•"/>
+            </a:pPr>
+            <a:endParaRPr lang="en-PH" sz="2000" dirty="0"/>
+          </a:p>
+          <a:p>
+            <a:r>
+              <a:rPr lang="en-PH" sz="2000" dirty="0" smtClean="0"/>
+              <a:t>To commit your changes from the local working copy to the repository:</a:t>
+            </a:r>
+          </a:p>
+          <a:p>
+            <a:pPr marL="800100" lvl="1" indent="-342900">
+              <a:buFont typeface="Arial" panose="020B0604020202020204" pitchFamily="34" charset="0"/>
+              <a:buChar char="•"/>
+            </a:pPr>
+            <a:r>
+              <a:rPr lang="en-PH" sz="2000" dirty="0" smtClean="0"/>
+              <a:t>CVS, SVN and </a:t>
+            </a:r>
+            <a:r>
+              <a:rPr lang="en-PH" sz="2000" dirty="0" err="1" smtClean="0"/>
+              <a:t>Git</a:t>
+            </a:r>
+            <a:r>
+              <a:rPr lang="en-PH" sz="2000" dirty="0" smtClean="0"/>
+              <a:t> -&gt; commit –m “&lt;Commit message here&gt;” [specific files, for selective commit only]</a:t>
+            </a:r>
+          </a:p>
+          <a:p>
+            <a:pPr marL="1257300" lvl="2" indent="-342900">
+              <a:buFont typeface="Arial" panose="020B0604020202020204" pitchFamily="34" charset="0"/>
+              <a:buChar char="•"/>
+            </a:pPr>
+            <a:r>
+              <a:rPr lang="en-PH" sz="2000" dirty="0" smtClean="0"/>
+              <a:t>Example -&gt; </a:t>
+            </a:r>
+            <a:r>
+              <a:rPr lang="en-PH" sz="2000" dirty="0" err="1" smtClean="0"/>
+              <a:t>svn</a:t>
+            </a:r>
+            <a:r>
+              <a:rPr lang="en-PH" sz="2000" dirty="0" smtClean="0"/>
+              <a:t> commit –m “Fixed regex for validation”</a:t>
+            </a:r>
           </a:p>
         </p:txBody>
       </p:sp>
@@ -5086,6 +5602,13 @@
   <p:clrMapOvr>
     <a:masterClrMapping/>
   </p:clrMapOvr>
+  <p:timing>
+    <p:tnLst>
+      <p:par>
+        <p:cTn id="1" dur="indefinite" restart="never" nodeType="tmRoot"/>
+      </p:par>
+    </p:tnLst>
+  </p:timing>
 </p:sld>
 </file>
 

</xml_diff>